<commit_message>
big step host stuff
did a lot of notebooking today, some more tables, about 80-90% there now
</commit_message>
<xml_diff>
--- a/06_notebooks/dissertation_plan [Autosaved].pptx
+++ b/06_notebooks/dissertation_plan [Autosaved].pptx
@@ -15,13 +15,14 @@
     <p:sldId id="263" r:id="rId9"/>
     <p:sldId id="264" r:id="rId10"/>
     <p:sldId id="265" r:id="rId11"/>
-    <p:sldId id="266" r:id="rId12"/>
-    <p:sldId id="267" r:id="rId13"/>
-    <p:sldId id="259" r:id="rId14"/>
-    <p:sldId id="260" r:id="rId15"/>
-    <p:sldId id="262" r:id="rId16"/>
-    <p:sldId id="268" r:id="rId17"/>
-    <p:sldId id="269" r:id="rId18"/>
+    <p:sldId id="273" r:id="rId12"/>
+    <p:sldId id="266" r:id="rId13"/>
+    <p:sldId id="267" r:id="rId14"/>
+    <p:sldId id="259" r:id="rId15"/>
+    <p:sldId id="260" r:id="rId16"/>
+    <p:sldId id="262" r:id="rId17"/>
+    <p:sldId id="268" r:id="rId18"/>
+    <p:sldId id="269" r:id="rId19"/>
   </p:sldIdLst>
   <p:sldSz cx="12192000" cy="6858000"/>
   <p:notesSz cx="6858000" cy="9144000"/>
@@ -277,7 +278,7 @@
           <a:p>
             <a:fld id="{6A1B377F-046E-4B32-A3E7-5F51D184938C}" type="datetimeFigureOut">
               <a:rPr lang="en-GB" smtClean="0"/>
-              <a:t>11/06/2025</a:t>
+              <a:t>13/06/2025</a:t>
             </a:fld>
             <a:endParaRPr lang="en-GB"/>
           </a:p>
@@ -477,7 +478,7 @@
           <a:p>
             <a:fld id="{6A1B377F-046E-4B32-A3E7-5F51D184938C}" type="datetimeFigureOut">
               <a:rPr lang="en-GB" smtClean="0"/>
-              <a:t>11/06/2025</a:t>
+              <a:t>13/06/2025</a:t>
             </a:fld>
             <a:endParaRPr lang="en-GB"/>
           </a:p>
@@ -687,7 +688,7 @@
           <a:p>
             <a:fld id="{6A1B377F-046E-4B32-A3E7-5F51D184938C}" type="datetimeFigureOut">
               <a:rPr lang="en-GB" smtClean="0"/>
-              <a:t>11/06/2025</a:t>
+              <a:t>13/06/2025</a:t>
             </a:fld>
             <a:endParaRPr lang="en-GB"/>
           </a:p>
@@ -887,7 +888,7 @@
           <a:p>
             <a:fld id="{6A1B377F-046E-4B32-A3E7-5F51D184938C}" type="datetimeFigureOut">
               <a:rPr lang="en-GB" smtClean="0"/>
-              <a:t>11/06/2025</a:t>
+              <a:t>13/06/2025</a:t>
             </a:fld>
             <a:endParaRPr lang="en-GB"/>
           </a:p>
@@ -1163,7 +1164,7 @@
           <a:p>
             <a:fld id="{6A1B377F-046E-4B32-A3E7-5F51D184938C}" type="datetimeFigureOut">
               <a:rPr lang="en-GB" smtClean="0"/>
-              <a:t>11/06/2025</a:t>
+              <a:t>13/06/2025</a:t>
             </a:fld>
             <a:endParaRPr lang="en-GB"/>
           </a:p>
@@ -1431,7 +1432,7 @@
           <a:p>
             <a:fld id="{6A1B377F-046E-4B32-A3E7-5F51D184938C}" type="datetimeFigureOut">
               <a:rPr lang="en-GB" smtClean="0"/>
-              <a:t>11/06/2025</a:t>
+              <a:t>13/06/2025</a:t>
             </a:fld>
             <a:endParaRPr lang="en-GB"/>
           </a:p>
@@ -1846,7 +1847,7 @@
           <a:p>
             <a:fld id="{6A1B377F-046E-4B32-A3E7-5F51D184938C}" type="datetimeFigureOut">
               <a:rPr lang="en-GB" smtClean="0"/>
-              <a:t>11/06/2025</a:t>
+              <a:t>13/06/2025</a:t>
             </a:fld>
             <a:endParaRPr lang="en-GB"/>
           </a:p>
@@ -1988,7 +1989,7 @@
           <a:p>
             <a:fld id="{6A1B377F-046E-4B32-A3E7-5F51D184938C}" type="datetimeFigureOut">
               <a:rPr lang="en-GB" smtClean="0"/>
-              <a:t>11/06/2025</a:t>
+              <a:t>13/06/2025</a:t>
             </a:fld>
             <a:endParaRPr lang="en-GB"/>
           </a:p>
@@ -2101,7 +2102,7 @@
           <a:p>
             <a:fld id="{6A1B377F-046E-4B32-A3E7-5F51D184938C}" type="datetimeFigureOut">
               <a:rPr lang="en-GB" smtClean="0"/>
-              <a:t>11/06/2025</a:t>
+              <a:t>13/06/2025</a:t>
             </a:fld>
             <a:endParaRPr lang="en-GB"/>
           </a:p>
@@ -2414,7 +2415,7 @@
           <a:p>
             <a:fld id="{6A1B377F-046E-4B32-A3E7-5F51D184938C}" type="datetimeFigureOut">
               <a:rPr lang="en-GB" smtClean="0"/>
-              <a:t>11/06/2025</a:t>
+              <a:t>13/06/2025</a:t>
             </a:fld>
             <a:endParaRPr lang="en-GB"/>
           </a:p>
@@ -2703,7 +2704,7 @@
           <a:p>
             <a:fld id="{6A1B377F-046E-4B32-A3E7-5F51D184938C}" type="datetimeFigureOut">
               <a:rPr lang="en-GB" smtClean="0"/>
-              <a:t>11/06/2025</a:t>
+              <a:t>13/06/2025</a:t>
             </a:fld>
             <a:endParaRPr lang="en-GB"/>
           </a:p>
@@ -2946,7 +2947,7 @@
           <a:p>
             <a:fld id="{6A1B377F-046E-4B32-A3E7-5F51D184938C}" type="datetimeFigureOut">
               <a:rPr lang="en-GB" smtClean="0"/>
-              <a:t>11/06/2025</a:t>
+              <a:t>13/06/2025</a:t>
             </a:fld>
             <a:endParaRPr lang="en-GB"/>
           </a:p>
@@ -3548,6 +3549,20 @@
               <a:t>My choice at the moment is between Quarto book and Quarto manuscript.</a:t>
             </a:r>
           </a:p>
+          <a:p>
+            <a:r>
+              <a:rPr lang="en-GB" dirty="0"/>
+              <a:t>The whole GCF / GCA </a:t>
+            </a:r>
+            <a:r>
+              <a:rPr lang="en-GB" dirty="0" err="1"/>
+              <a:t>debaucle</a:t>
+            </a:r>
+            <a:r>
+              <a:rPr lang="en-GB" dirty="0"/>
+              <a:t> </a:t>
+            </a:r>
+          </a:p>
         </p:txBody>
       </p:sp>
     </p:spTree>
@@ -3585,7 +3600,7 @@
           <p:cNvPr id="2" name="Title 1">
             <a:extLst>
               <a:ext uri="{FF2B5EF4-FFF2-40B4-BE49-F238E27FC236}">
-                <a16:creationId xmlns:a16="http://schemas.microsoft.com/office/drawing/2014/main" id="{72487B3D-B8A0-7FA7-49C0-8744E7A390E8}"/>
+                <a16:creationId xmlns:a16="http://schemas.microsoft.com/office/drawing/2014/main" id="{146254BF-20A7-E2D6-AAF3-A7840D985014}"/>
               </a:ext>
             </a:extLst>
           </p:cNvPr>
@@ -3602,8 +3617,8 @@
           <a:lstStyle/>
           <a:p>
             <a:r>
-              <a:rPr lang="en-GB" dirty="0"/>
-              <a:t>First steps – answer major problem 1</a:t>
+              <a:rPr lang="en-GB"/>
+              <a:t>More problems (?)</a:t>
             </a:r>
           </a:p>
         </p:txBody>
@@ -3613,7 +3628,7 @@
           <p:cNvPr id="3" name="Content Placeholder 2">
             <a:extLst>
               <a:ext uri="{FF2B5EF4-FFF2-40B4-BE49-F238E27FC236}">
-                <a16:creationId xmlns:a16="http://schemas.microsoft.com/office/drawing/2014/main" id="{1A06D989-5BB2-1AAC-6CBB-AE98AE0DE476}"/>
+                <a16:creationId xmlns:a16="http://schemas.microsoft.com/office/drawing/2014/main" id="{D492E436-811C-27D4-F252-F94FBB03CD65}"/>
               </a:ext>
             </a:extLst>
           </p:cNvPr>
@@ -3626,121 +3641,17 @@
         </p:nvSpPr>
         <p:spPr/>
         <p:txBody>
-          <a:bodyPr>
-            <a:normAutofit fontScale="85000" lnSpcReduction="20000"/>
-          </a:bodyPr>
-          <a:lstStyle/>
-          <a:p>
-            <a:pPr marL="514350" indent="-514350">
-              <a:buFont typeface="+mj-lt"/>
-              <a:buAutoNum type="arabicPeriod"/>
-            </a:pPr>
-            <a:r>
-              <a:rPr lang="en-GB" dirty="0"/>
-              <a:t>Characterise host information currently held</a:t>
-            </a:r>
-          </a:p>
-          <a:p>
-            <a:pPr marL="971550" lvl="1" indent="-514350">
-              <a:buFont typeface="+mj-lt"/>
-              <a:buAutoNum type="arabicPeriod"/>
-            </a:pPr>
-            <a:r>
-              <a:rPr lang="en-GB" dirty="0"/>
-              <a:t>I have host info, I don’t think it looks good, but I don’t have anything else to compare it against, no metrics.</a:t>
-            </a:r>
-          </a:p>
-          <a:p>
-            <a:pPr marL="971550" lvl="1" indent="-514350">
-              <a:buFont typeface="+mj-lt"/>
-              <a:buAutoNum type="arabicPeriod"/>
-            </a:pPr>
-            <a:r>
-              <a:rPr lang="en-GB" dirty="0"/>
-              <a:t>Load metadata into SQL database for query,</a:t>
-            </a:r>
-          </a:p>
-          <a:p>
-            <a:pPr marL="971550" lvl="1" indent="-514350">
-              <a:buFont typeface="+mj-lt"/>
-              <a:buAutoNum type="arabicPeriod"/>
-            </a:pPr>
-            <a:r>
-              <a:rPr lang="en-GB" dirty="0"/>
-              <a:t>Manually categorise host information, because I cant think of a better way</a:t>
-            </a:r>
-          </a:p>
-          <a:p>
-            <a:pPr marL="971550" lvl="1" indent="-514350">
-              <a:buFont typeface="+mj-lt"/>
-              <a:buAutoNum type="arabicPeriod"/>
-            </a:pPr>
-            <a:r>
-              <a:rPr lang="en-GB" dirty="0"/>
-              <a:t>Produce some tables / a dashboard for information like “how many samples have hosts?”, “how many hosts are animal?”, “how many classes are represented?”</a:t>
-            </a:r>
-          </a:p>
-          <a:p>
-            <a:pPr marL="971550" lvl="1" indent="-514350">
-              <a:buFont typeface="+mj-lt"/>
-              <a:buAutoNum type="arabicPeriod"/>
-            </a:pPr>
-            <a:r>
-              <a:rPr lang="en-GB" dirty="0"/>
-              <a:t>This will give me metrics that I can compare new data with to help me see if new genera are improvements.</a:t>
-            </a:r>
-          </a:p>
-          <a:p>
-            <a:pPr marL="514350" indent="-514350">
-              <a:buFont typeface="+mj-lt"/>
-              <a:buAutoNum type="arabicPeriod"/>
-            </a:pPr>
-            <a:r>
-              <a:rPr lang="en-GB" dirty="0"/>
-              <a:t>Find good looking genus, I think the best to start with is </a:t>
-            </a:r>
-            <a:r>
-              <a:rPr lang="en-GB" i="1" dirty="0"/>
-              <a:t>E. coli</a:t>
-            </a:r>
-            <a:endParaRPr lang="en-GB" dirty="0"/>
-          </a:p>
-          <a:p>
-            <a:pPr marL="971550" lvl="1" indent="-514350">
-              <a:buFont typeface="+mj-lt"/>
-              <a:buAutoNum type="arabicPeriod"/>
-            </a:pPr>
-            <a:r>
-              <a:rPr lang="en-GB" dirty="0"/>
-              <a:t>Perform the same analysis described above and compare the metrics</a:t>
-            </a:r>
-          </a:p>
-          <a:p>
-            <a:pPr marL="971550" lvl="1" indent="-514350">
-              <a:buFont typeface="+mj-lt"/>
-              <a:buAutoNum type="arabicPeriod"/>
-            </a:pPr>
-            <a:r>
-              <a:rPr lang="en-GB" dirty="0"/>
-              <a:t>If it isn’t better, look for the genus with the most samples on NCBI and try some more until a good one is found.</a:t>
-            </a:r>
-          </a:p>
-          <a:p>
-            <a:pPr marL="971550" lvl="1" indent="-514350">
-              <a:buFont typeface="+mj-lt"/>
-              <a:buAutoNum type="arabicPeriod"/>
-            </a:pPr>
-            <a:r>
-              <a:rPr lang="en-GB" dirty="0"/>
-              <a:t>If E. coli is the one, then I hit problem 2, how do I get all the KEGG pathways in a non-painful manner</a:t>
-            </a:r>
+          <a:bodyPr/>
+          <a:lstStyle/>
+          <a:p>
+            <a:endParaRPr lang="en-GB"/>
           </a:p>
         </p:txBody>
       </p:sp>
     </p:spTree>
     <p:extLst>
       <p:ext uri="{BB962C8B-B14F-4D97-AF65-F5344CB8AC3E}">
-        <p14:creationId xmlns:p14="http://schemas.microsoft.com/office/powerpoint/2010/main" val="2037494248"/>
+        <p14:creationId xmlns:p14="http://schemas.microsoft.com/office/powerpoint/2010/main" val="589666896"/>
       </p:ext>
     </p:extLst>
   </p:cSld>
@@ -3772,7 +3683,7 @@
           <p:cNvPr id="2" name="Title 1">
             <a:extLst>
               <a:ext uri="{FF2B5EF4-FFF2-40B4-BE49-F238E27FC236}">
-                <a16:creationId xmlns:a16="http://schemas.microsoft.com/office/drawing/2014/main" id="{07D95F75-71B3-AC40-50DE-2AF524F8D368}"/>
+                <a16:creationId xmlns:a16="http://schemas.microsoft.com/office/drawing/2014/main" id="{72487B3D-B8A0-7FA7-49C0-8744E7A390E8}"/>
               </a:ext>
             </a:extLst>
           </p:cNvPr>
@@ -3790,7 +3701,7 @@
           <a:p>
             <a:r>
               <a:rPr lang="en-GB" dirty="0"/>
-              <a:t>First steps – answer major problem 2</a:t>
+              <a:t>First steps – answer major problem 1</a:t>
             </a:r>
           </a:p>
         </p:txBody>
@@ -3800,7 +3711,7 @@
           <p:cNvPr id="3" name="Content Placeholder 2">
             <a:extLst>
               <a:ext uri="{FF2B5EF4-FFF2-40B4-BE49-F238E27FC236}">
-                <a16:creationId xmlns:a16="http://schemas.microsoft.com/office/drawing/2014/main" id="{1B278A58-95F2-89E7-A233-DF748BE8271B}"/>
+                <a16:creationId xmlns:a16="http://schemas.microsoft.com/office/drawing/2014/main" id="{1A06D989-5BB2-1AAC-6CBB-AE98AE0DE476}"/>
               </a:ext>
             </a:extLst>
           </p:cNvPr>
@@ -3813,7 +3724,9 @@
         </p:nvSpPr>
         <p:spPr/>
         <p:txBody>
-          <a:bodyPr/>
+          <a:bodyPr>
+            <a:normAutofit fontScale="85000" lnSpcReduction="20000"/>
+          </a:bodyPr>
           <a:lstStyle/>
           <a:p>
             <a:pPr marL="514350" indent="-514350">
@@ -3822,23 +3735,57 @@
             </a:pPr>
             <a:r>
               <a:rPr lang="en-GB" dirty="0"/>
-              <a:t>I have the annotated protein </a:t>
-            </a:r>
-            <a:r>
-              <a:rPr lang="en-GB" dirty="0" err="1"/>
-              <a:t>fastas</a:t>
-            </a:r>
-            <a:r>
-              <a:rPr lang="en-GB" dirty="0"/>
-              <a:t> from </a:t>
-            </a:r>
-            <a:r>
-              <a:rPr lang="en-GB" dirty="0" err="1"/>
-              <a:t>EggNOG</a:t>
-            </a:r>
-            <a:r>
-              <a:rPr lang="en-GB" dirty="0"/>
-              <a:t>-mapper for my samples taken last year. </a:t>
+              <a:t>Characterise host information currently held</a:t>
+            </a:r>
+          </a:p>
+          <a:p>
+            <a:pPr marL="971550" lvl="1" indent="-514350">
+              <a:buFont typeface="+mj-lt"/>
+              <a:buAutoNum type="arabicPeriod"/>
+            </a:pPr>
+            <a:r>
+              <a:rPr lang="en-GB" dirty="0"/>
+              <a:t>I have host info, I don’t think it looks good, but I don’t have anything else to compare it against, no metrics.</a:t>
+            </a:r>
+          </a:p>
+          <a:p>
+            <a:pPr marL="971550" lvl="1" indent="-514350">
+              <a:buFont typeface="+mj-lt"/>
+              <a:buAutoNum type="arabicPeriod"/>
+            </a:pPr>
+            <a:r>
+              <a:rPr lang="en-GB" dirty="0"/>
+              <a:t>Load metadata into SQL database for query,</a:t>
+            </a:r>
+          </a:p>
+          <a:p>
+            <a:pPr marL="971550" lvl="1" indent="-514350">
+              <a:buFont typeface="+mj-lt"/>
+              <a:buAutoNum type="arabicPeriod"/>
+            </a:pPr>
+            <a:r>
+              <a:rPr lang="en-GB" dirty="0"/>
+              <a:t>Manually categorise host information, because I cant think of a better way</a:t>
+            </a:r>
+          </a:p>
+          <a:p>
+            <a:pPr marL="971550" lvl="1" indent="-514350">
+              <a:buFont typeface="+mj-lt"/>
+              <a:buAutoNum type="arabicPeriod"/>
+            </a:pPr>
+            <a:r>
+              <a:rPr lang="en-GB" dirty="0"/>
+              <a:t>Produce some tables / a dashboard for information like “how many samples have hosts?”, “how many hosts are animal?”, “how many classes are represented?”</a:t>
+            </a:r>
+          </a:p>
+          <a:p>
+            <a:pPr marL="971550" lvl="1" indent="-514350">
+              <a:buFont typeface="+mj-lt"/>
+              <a:buAutoNum type="arabicPeriod"/>
+            </a:pPr>
+            <a:r>
+              <a:rPr lang="en-GB" dirty="0"/>
+              <a:t>This will give me metrics that I can compare new data with to help me see if new genera are improvements.</a:t>
             </a:r>
           </a:p>
           <a:p>
@@ -3848,43 +3795,42 @@
             </a:pPr>
             <a:r>
               <a:rPr lang="en-GB" dirty="0"/>
-              <a:t>I can compare this KEGG information with KEGG information derived from whatever weird shortcut route Claude.ai helps me go down. </a:t>
-            </a:r>
-          </a:p>
-          <a:p>
-            <a:pPr marL="514350" indent="-514350">
+              <a:t>Find good looking genus, I think the best to start with is </a:t>
+            </a:r>
+            <a:r>
+              <a:rPr lang="en-GB" i="1" dirty="0"/>
+              <a:t>E. coli</a:t>
+            </a:r>
+            <a:endParaRPr lang="en-GB" dirty="0"/>
+          </a:p>
+          <a:p>
+            <a:pPr marL="971550" lvl="1" indent="-514350">
               <a:buFont typeface="+mj-lt"/>
               <a:buAutoNum type="arabicPeriod"/>
             </a:pPr>
             <a:r>
               <a:rPr lang="en-GB" dirty="0"/>
-              <a:t>If this demonstrates good similarity in results, I can use this hopefully much faster method to obtain KEGG pathway information for the genus selected in Major Problem 1</a:t>
-            </a:r>
-          </a:p>
-          <a:p>
-            <a:pPr marL="514350" indent="-514350">
+              <a:t>Perform the same analysis described above and compare the metrics</a:t>
+            </a:r>
+          </a:p>
+          <a:p>
+            <a:pPr marL="971550" lvl="1" indent="-514350">
               <a:buFont typeface="+mj-lt"/>
               <a:buAutoNum type="arabicPeriod"/>
             </a:pPr>
             <a:r>
               <a:rPr lang="en-GB" dirty="0"/>
-              <a:t>If it does not, likely </a:t>
-            </a:r>
-            <a:r>
-              <a:rPr lang="en-GB" dirty="0" err="1"/>
-              <a:t>EggNOG</a:t>
-            </a:r>
-            <a:r>
-              <a:rPr lang="en-GB" dirty="0"/>
-              <a:t>-mapper is the only viable solution and I will have to accept that the process will be </a:t>
-            </a:r>
-            <a:r>
-              <a:rPr lang="en-GB" dirty="0" err="1"/>
-              <a:t>grueling</a:t>
-            </a:r>
-            <a:r>
-              <a:rPr lang="en-GB" dirty="0"/>
-              <a:t>.</a:t>
+              <a:t>If it isn’t better, look for the genus with the most samples on NCBI and try some more until a good one is found.</a:t>
+            </a:r>
+          </a:p>
+          <a:p>
+            <a:pPr marL="971550" lvl="1" indent="-514350">
+              <a:buFont typeface="+mj-lt"/>
+              <a:buAutoNum type="arabicPeriod"/>
+            </a:pPr>
+            <a:r>
+              <a:rPr lang="en-GB" dirty="0"/>
+              <a:t>If E. coli is the one, then I hit problem 2, how do I get all the KEGG pathways in a non-painful manner</a:t>
             </a:r>
           </a:p>
         </p:txBody>
@@ -3892,7 +3838,7 @@
     </p:spTree>
     <p:extLst>
       <p:ext uri="{BB962C8B-B14F-4D97-AF65-F5344CB8AC3E}">
-        <p14:creationId xmlns:p14="http://schemas.microsoft.com/office/powerpoint/2010/main" val="1552344799"/>
+        <p14:creationId xmlns:p14="http://schemas.microsoft.com/office/powerpoint/2010/main" val="2037494248"/>
       </p:ext>
     </p:extLst>
   </p:cSld>
@@ -3924,7 +3870,7 @@
           <p:cNvPr id="2" name="Title 1">
             <a:extLst>
               <a:ext uri="{FF2B5EF4-FFF2-40B4-BE49-F238E27FC236}">
-                <a16:creationId xmlns:a16="http://schemas.microsoft.com/office/drawing/2014/main" id="{B1E5CCA1-F5BC-ABBA-608D-6DF33AE4AD07}"/>
+                <a16:creationId xmlns:a16="http://schemas.microsoft.com/office/drawing/2014/main" id="{07D95F75-71B3-AC40-50DE-2AF524F8D368}"/>
               </a:ext>
             </a:extLst>
           </p:cNvPr>
@@ -3942,7 +3888,7 @@
           <a:p>
             <a:r>
               <a:rPr lang="en-GB" dirty="0"/>
-              <a:t>What I want the outputs to look like</a:t>
+              <a:t>First steps – answer major problem 2</a:t>
             </a:r>
           </a:p>
         </p:txBody>
@@ -3952,7 +3898,7 @@
           <p:cNvPr id="3" name="Content Placeholder 2">
             <a:extLst>
               <a:ext uri="{FF2B5EF4-FFF2-40B4-BE49-F238E27FC236}">
-                <a16:creationId xmlns:a16="http://schemas.microsoft.com/office/drawing/2014/main" id="{16D75308-A4C6-08E4-F14E-076DB8422302}"/>
+                <a16:creationId xmlns:a16="http://schemas.microsoft.com/office/drawing/2014/main" id="{1B278A58-95F2-89E7-A233-DF748BE8271B}"/>
               </a:ext>
             </a:extLst>
           </p:cNvPr>
@@ -3965,136 +3911,86 @@
         </p:nvSpPr>
         <p:spPr/>
         <p:txBody>
-          <a:bodyPr>
-            <a:normAutofit fontScale="92500" lnSpcReduction="10000"/>
-          </a:bodyPr>
-          <a:lstStyle/>
-          <a:p>
-            <a:r>
-              <a:rPr lang="en-GB" dirty="0"/>
-              <a:t>What is needed to answer the hypothesis?</a:t>
-            </a:r>
-          </a:p>
-          <a:p>
-            <a:pPr lvl="1"/>
-            <a:r>
-              <a:rPr lang="en-US" sz="1600" dirty="0">
-                <a:effectLst/>
-                <a:latin typeface="Aptos" panose="020B0004020202020204" pitchFamily="34" charset="0"/>
-                <a:ea typeface="Aptos" panose="020B0004020202020204" pitchFamily="34" charset="0"/>
-                <a:cs typeface="Times New Roman" panose="02020603050405020304" pitchFamily="18" charset="0"/>
-              </a:rPr>
-              <a:t>Do bacterial species and genera significantly differ in gene function, beyond what would be expected from evolutionary history alone, such as by host environment or geographic location? Yes, I expect they adapt</a:t>
-            </a:r>
-            <a:endParaRPr lang="en-GB" sz="1600" dirty="0">
-              <a:effectLst/>
-              <a:latin typeface="Aptos" panose="020B0004020202020204" pitchFamily="34" charset="0"/>
-              <a:ea typeface="Aptos" panose="020B0004020202020204" pitchFamily="34" charset="0"/>
-              <a:cs typeface="Times New Roman" panose="02020603050405020304" pitchFamily="18" charset="0"/>
-            </a:endParaRPr>
-          </a:p>
-          <a:p>
-            <a:r>
-              <a:rPr lang="en-GB" sz="2400" dirty="0"/>
-              <a:t>Visuals to display results</a:t>
-            </a:r>
-          </a:p>
-          <a:p>
-            <a:pPr lvl="1"/>
-            <a:r>
-              <a:rPr lang="en-GB" sz="2000" dirty="0">
-                <a:effectLst/>
-                <a:ea typeface="Times New Roman" panose="02020603050405020304" pitchFamily="18" charset="0"/>
-                <a:cs typeface="Times New Roman" panose="02020603050405020304" pitchFamily="18" charset="0"/>
-              </a:rPr>
-              <a:t>Show trends where there are functional differences where there are correlations with </a:t>
-            </a:r>
-            <a:r>
-              <a:rPr lang="en-GB" sz="2000" dirty="0">
-                <a:ea typeface="Times New Roman" panose="02020603050405020304" pitchFamily="18" charset="0"/>
-                <a:cs typeface="Times New Roman" panose="02020603050405020304" pitchFamily="18" charset="0"/>
-              </a:rPr>
-              <a:t>different hosts or geographies</a:t>
-            </a:r>
-          </a:p>
-          <a:p>
-            <a:pPr lvl="2"/>
-            <a:r>
-              <a:rPr lang="en-GB" sz="1600" dirty="0">
-                <a:effectLst/>
-                <a:ea typeface="Times New Roman" panose="02020603050405020304" pitchFamily="18" charset="0"/>
-                <a:cs typeface="Times New Roman" panose="02020603050405020304" pitchFamily="18" charset="0"/>
-              </a:rPr>
-              <a:t>Like with geography or host</a:t>
-            </a:r>
-          </a:p>
-          <a:p>
-            <a:r>
-              <a:rPr lang="en-GB" sz="2400" dirty="0">
-                <a:effectLst/>
-                <a:ea typeface="Times New Roman" panose="02020603050405020304" pitchFamily="18" charset="0"/>
-                <a:cs typeface="Times New Roman" panose="02020603050405020304" pitchFamily="18" charset="0"/>
-              </a:rPr>
-              <a:t>Also, need data of just evolution and phylogeny to compare against, so I can see if a change is by the factor, or just through evo differences.</a:t>
-            </a:r>
-          </a:p>
-          <a:p>
-            <a:pPr lvl="1"/>
-            <a:r>
-              <a:rPr lang="en-GB" sz="2000" dirty="0">
-                <a:effectLst/>
-                <a:ea typeface="Times New Roman" panose="02020603050405020304" pitchFamily="18" charset="0"/>
-                <a:cs typeface="Times New Roman" panose="02020603050405020304" pitchFamily="18" charset="0"/>
-              </a:rPr>
-              <a:t>Possibly more </a:t>
-            </a:r>
-            <a:r>
-              <a:rPr lang="en-GB" sz="2000" dirty="0" err="1">
-                <a:effectLst/>
-                <a:ea typeface="Times New Roman" panose="02020603050405020304" pitchFamily="18" charset="0"/>
-                <a:cs typeface="Times New Roman" panose="02020603050405020304" pitchFamily="18" charset="0"/>
-              </a:rPr>
-              <a:t>phylo</a:t>
-            </a:r>
-            <a:r>
-              <a:rPr lang="en-GB" sz="2000" dirty="0">
-                <a:effectLst/>
-                <a:ea typeface="Times New Roman" panose="02020603050405020304" pitchFamily="18" charset="0"/>
-                <a:cs typeface="Times New Roman" panose="02020603050405020304" pitchFamily="18" charset="0"/>
-              </a:rPr>
-              <a:t> trees, a heatmap just for evo diffs, like the one from Y2</a:t>
-            </a:r>
-          </a:p>
-          <a:p>
-            <a:pPr lvl="1"/>
-            <a:r>
-              <a:rPr lang="en-GB" sz="2000" dirty="0">
-                <a:ea typeface="Times New Roman" panose="02020603050405020304" pitchFamily="18" charset="0"/>
-                <a:cs typeface="Times New Roman" panose="02020603050405020304" pitchFamily="18" charset="0"/>
-              </a:rPr>
-              <a:t>Maybe give this data its own dashboard</a:t>
-            </a:r>
-          </a:p>
-          <a:p>
-            <a:r>
-              <a:rPr lang="en-GB" sz="2400" dirty="0">
-                <a:ea typeface="Times New Roman" panose="02020603050405020304" pitchFamily="18" charset="0"/>
-                <a:cs typeface="Times New Roman" panose="02020603050405020304" pitchFamily="18" charset="0"/>
-              </a:rPr>
-              <a:t>Maybe like a database of all the differences, some way to compare all the differences found in the heatmaps. Run different queries on the same subjects. Some final way of combining the data from the three sources into one comparison.</a:t>
-            </a:r>
-            <a:endParaRPr lang="en-GB" sz="2400" dirty="0">
-              <a:effectLst/>
-              <a:ea typeface="Times New Roman" panose="02020603050405020304" pitchFamily="18" charset="0"/>
-              <a:cs typeface="Times New Roman" panose="02020603050405020304" pitchFamily="18" charset="0"/>
-            </a:endParaRPr>
+          <a:bodyPr/>
+          <a:lstStyle/>
+          <a:p>
+            <a:pPr marL="514350" indent="-514350">
+              <a:buFont typeface="+mj-lt"/>
+              <a:buAutoNum type="arabicPeriod"/>
+            </a:pPr>
+            <a:r>
+              <a:rPr lang="en-GB" dirty="0"/>
+              <a:t>I have the annotated protein </a:t>
+            </a:r>
+            <a:r>
+              <a:rPr lang="en-GB" dirty="0" err="1"/>
+              <a:t>fastas</a:t>
+            </a:r>
+            <a:r>
+              <a:rPr lang="en-GB" dirty="0"/>
+              <a:t> from </a:t>
+            </a:r>
+            <a:r>
+              <a:rPr lang="en-GB" dirty="0" err="1"/>
+              <a:t>EggNOG</a:t>
+            </a:r>
+            <a:r>
+              <a:rPr lang="en-GB" dirty="0"/>
+              <a:t>-mapper for my samples taken last year. </a:t>
+            </a:r>
+          </a:p>
+          <a:p>
+            <a:pPr marL="514350" indent="-514350">
+              <a:buFont typeface="+mj-lt"/>
+              <a:buAutoNum type="arabicPeriod"/>
+            </a:pPr>
+            <a:r>
+              <a:rPr lang="en-GB" dirty="0"/>
+              <a:t>I can compare this KEGG information with KEGG information derived from whatever weird shortcut route Claude.ai helps me go down. </a:t>
+            </a:r>
+          </a:p>
+          <a:p>
+            <a:pPr marL="514350" indent="-514350">
+              <a:buFont typeface="+mj-lt"/>
+              <a:buAutoNum type="arabicPeriod"/>
+            </a:pPr>
+            <a:r>
+              <a:rPr lang="en-GB" dirty="0"/>
+              <a:t>If this demonstrates good similarity in results, I can use this hopefully much faster method to obtain KEGG pathway information for the genus selected in Major Problem 1</a:t>
+            </a:r>
+          </a:p>
+          <a:p>
+            <a:pPr marL="514350" indent="-514350">
+              <a:buFont typeface="+mj-lt"/>
+              <a:buAutoNum type="arabicPeriod"/>
+            </a:pPr>
+            <a:r>
+              <a:rPr lang="en-GB" dirty="0"/>
+              <a:t>If it does not, likely </a:t>
+            </a:r>
+            <a:r>
+              <a:rPr lang="en-GB" dirty="0" err="1"/>
+              <a:t>EggNOG</a:t>
+            </a:r>
+            <a:r>
+              <a:rPr lang="en-GB" dirty="0"/>
+              <a:t>-mapper is the only viable solution and I will have to accept that the process will be </a:t>
+            </a:r>
+            <a:r>
+              <a:rPr lang="en-GB" dirty="0" err="1"/>
+              <a:t>grueling</a:t>
+            </a:r>
+            <a:r>
+              <a:rPr lang="en-GB" dirty="0"/>
+              <a:t>.</a:t>
+            </a:r>
           </a:p>
         </p:txBody>
       </p:sp>
     </p:spTree>
     <p:extLst>
       <p:ext uri="{BB962C8B-B14F-4D97-AF65-F5344CB8AC3E}">
-        <p14:creationId xmlns:p14="http://schemas.microsoft.com/office/powerpoint/2010/main" val="3868474940"/>
+        <p14:creationId xmlns:p14="http://schemas.microsoft.com/office/powerpoint/2010/main" val="1552344799"/>
       </p:ext>
     </p:extLst>
   </p:cSld>
@@ -4126,7 +4022,7 @@
           <p:cNvPr id="2" name="Title 1">
             <a:extLst>
               <a:ext uri="{FF2B5EF4-FFF2-40B4-BE49-F238E27FC236}">
-                <a16:creationId xmlns:a16="http://schemas.microsoft.com/office/drawing/2014/main" id="{9D6F947A-8850-D5D1-5EEE-E7A99C3827EF}"/>
+                <a16:creationId xmlns:a16="http://schemas.microsoft.com/office/drawing/2014/main" id="{B1E5CCA1-F5BC-ABBA-608D-6DF33AE4AD07}"/>
               </a:ext>
             </a:extLst>
           </p:cNvPr>
@@ -4144,7 +4040,7 @@
           <a:p>
             <a:r>
               <a:rPr lang="en-GB" dirty="0"/>
-              <a:t>visuals</a:t>
+              <a:t>What I want the outputs to look like</a:t>
             </a:r>
           </a:p>
         </p:txBody>
@@ -4154,7 +4050,7 @@
           <p:cNvPr id="3" name="Content Placeholder 2">
             <a:extLst>
               <a:ext uri="{FF2B5EF4-FFF2-40B4-BE49-F238E27FC236}">
-                <a16:creationId xmlns:a16="http://schemas.microsoft.com/office/drawing/2014/main" id="{C4D6343C-155B-33F0-525A-DB102A4DCF08}"/>
+                <a16:creationId xmlns:a16="http://schemas.microsoft.com/office/drawing/2014/main" id="{16D75308-A4C6-08E4-F14E-076DB8422302}"/>
               </a:ext>
             </a:extLst>
           </p:cNvPr>
@@ -4174,58 +4070,129 @@
           <a:p>
             <a:r>
               <a:rPr lang="en-GB" dirty="0"/>
-              <a:t>Heatmap of host against KEGG-pathway</a:t>
+              <a:t>What is needed to answer the hypothesis?</a:t>
             </a:r>
           </a:p>
           <a:p>
             <a:pPr lvl="1"/>
             <a:r>
-              <a:rPr lang="en-GB" dirty="0"/>
-              <a:t>Colour is based on number of samples which contain that KEGG pathway with that host</a:t>
+              <a:rPr lang="en-US" sz="1600" dirty="0">
+                <a:effectLst/>
+                <a:latin typeface="Aptos" panose="020B0004020202020204" pitchFamily="34" charset="0"/>
+                <a:ea typeface="Aptos" panose="020B0004020202020204" pitchFamily="34" charset="0"/>
+                <a:cs typeface="Times New Roman" panose="02020603050405020304" pitchFamily="18" charset="0"/>
+              </a:rPr>
+              <a:t>Do bacterial species and genera significantly differ in gene function, beyond what would be expected from evolutionary history alone, such as by host environment or geographic location? Yes, I expect they adapt</a:t>
+            </a:r>
+            <a:endParaRPr lang="en-GB" sz="1600" dirty="0">
+              <a:effectLst/>
+              <a:latin typeface="Aptos" panose="020B0004020202020204" pitchFamily="34" charset="0"/>
+              <a:ea typeface="Aptos" panose="020B0004020202020204" pitchFamily="34" charset="0"/>
+              <a:cs typeface="Times New Roman" panose="02020603050405020304" pitchFamily="18" charset="0"/>
+            </a:endParaRPr>
+          </a:p>
+          <a:p>
+            <a:r>
+              <a:rPr lang="en-GB" sz="2400" dirty="0"/>
+              <a:t>Visuals to display results</a:t>
             </a:r>
           </a:p>
           <a:p>
             <a:pPr lvl="1"/>
             <a:r>
-              <a:rPr lang="en-GB" dirty="0"/>
-              <a:t>Brighter colours = more proportional samples with mammalian hosts have that pathway than is seen in fish, thus I conclude it is an adaptation to mammalian skin etc</a:t>
-            </a:r>
-          </a:p>
-          <a:p>
-            <a:r>
-              <a:rPr lang="en-GB" dirty="0"/>
-              <a:t>Heatmap of geography against KEGG-pathway</a:t>
+              <a:rPr lang="en-GB" sz="2000" dirty="0">
+                <a:effectLst/>
+                <a:ea typeface="Times New Roman" panose="02020603050405020304" pitchFamily="18" charset="0"/>
+                <a:cs typeface="Times New Roman" panose="02020603050405020304" pitchFamily="18" charset="0"/>
+              </a:rPr>
+              <a:t>Show trends where there are functional differences where there are correlations with </a:t>
+            </a:r>
+            <a:r>
+              <a:rPr lang="en-GB" sz="2000" dirty="0">
+                <a:ea typeface="Times New Roman" panose="02020603050405020304" pitchFamily="18" charset="0"/>
+                <a:cs typeface="Times New Roman" panose="02020603050405020304" pitchFamily="18" charset="0"/>
+              </a:rPr>
+              <a:t>different hosts or geographies</a:t>
+            </a:r>
+          </a:p>
+          <a:p>
+            <a:pPr lvl="2"/>
+            <a:r>
+              <a:rPr lang="en-GB" sz="1600" dirty="0">
+                <a:effectLst/>
+                <a:ea typeface="Times New Roman" panose="02020603050405020304" pitchFamily="18" charset="0"/>
+                <a:cs typeface="Times New Roman" panose="02020603050405020304" pitchFamily="18" charset="0"/>
+              </a:rPr>
+              <a:t>Like with geography or host</a:t>
+            </a:r>
+          </a:p>
+          <a:p>
+            <a:r>
+              <a:rPr lang="en-GB" sz="2400" dirty="0">
+                <a:effectLst/>
+                <a:ea typeface="Times New Roman" panose="02020603050405020304" pitchFamily="18" charset="0"/>
+                <a:cs typeface="Times New Roman" panose="02020603050405020304" pitchFamily="18" charset="0"/>
+              </a:rPr>
+              <a:t>Also, need data of just evolution and phylogeny to compare against, so I can see if a change is by the factor, or just through evo differences.</a:t>
             </a:r>
           </a:p>
           <a:p>
             <a:pPr lvl="1"/>
             <a:r>
-              <a:rPr lang="en-GB" dirty="0"/>
-              <a:t>Colour is based on number of samples which contain that KEGG pathway for that region</a:t>
+              <a:rPr lang="en-GB" sz="2000" dirty="0">
+                <a:effectLst/>
+                <a:ea typeface="Times New Roman" panose="02020603050405020304" pitchFamily="18" charset="0"/>
+                <a:cs typeface="Times New Roman" panose="02020603050405020304" pitchFamily="18" charset="0"/>
+              </a:rPr>
+              <a:t>Possibly more </a:t>
+            </a:r>
+            <a:r>
+              <a:rPr lang="en-GB" sz="2000" dirty="0" err="1">
+                <a:effectLst/>
+                <a:ea typeface="Times New Roman" panose="02020603050405020304" pitchFamily="18" charset="0"/>
+                <a:cs typeface="Times New Roman" panose="02020603050405020304" pitchFamily="18" charset="0"/>
+              </a:rPr>
+              <a:t>phylo</a:t>
+            </a:r>
+            <a:r>
+              <a:rPr lang="en-GB" sz="2000" dirty="0">
+                <a:effectLst/>
+                <a:ea typeface="Times New Roman" panose="02020603050405020304" pitchFamily="18" charset="0"/>
+                <a:cs typeface="Times New Roman" panose="02020603050405020304" pitchFamily="18" charset="0"/>
+              </a:rPr>
+              <a:t> trees, a heatmap just for evo diffs, like the one from Y2</a:t>
             </a:r>
           </a:p>
           <a:p>
             <a:pPr lvl="1"/>
             <a:r>
-              <a:rPr lang="en-GB" dirty="0"/>
-              <a:t>Brighter colours = more proportional samples in NA than SA, thus I conclude it is an adaptation to NA etc</a:t>
-            </a:r>
-          </a:p>
-          <a:p>
-            <a:r>
-              <a:rPr lang="en-GB" dirty="0"/>
-              <a:t>This relates to how I want to do dashboards for both of these variables with more metadata on these and user-driven engagement stuff</a:t>
-            </a:r>
-          </a:p>
-          <a:p>
-            <a:endParaRPr lang="en-GB" dirty="0"/>
+              <a:rPr lang="en-GB" sz="2000" dirty="0">
+                <a:ea typeface="Times New Roman" panose="02020603050405020304" pitchFamily="18" charset="0"/>
+                <a:cs typeface="Times New Roman" panose="02020603050405020304" pitchFamily="18" charset="0"/>
+              </a:rPr>
+              <a:t>Maybe give this data its own dashboard</a:t>
+            </a:r>
+          </a:p>
+          <a:p>
+            <a:r>
+              <a:rPr lang="en-GB" sz="2400" dirty="0">
+                <a:ea typeface="Times New Roman" panose="02020603050405020304" pitchFamily="18" charset="0"/>
+                <a:cs typeface="Times New Roman" panose="02020603050405020304" pitchFamily="18" charset="0"/>
+              </a:rPr>
+              <a:t>Maybe like a database of all the differences, some way to compare all the differences found in the heatmaps. Run different queries on the same subjects. Some final way of combining the data from the three sources into one comparison.</a:t>
+            </a:r>
+            <a:endParaRPr lang="en-GB" sz="2400" dirty="0">
+              <a:effectLst/>
+              <a:ea typeface="Times New Roman" panose="02020603050405020304" pitchFamily="18" charset="0"/>
+              <a:cs typeface="Times New Roman" panose="02020603050405020304" pitchFamily="18" charset="0"/>
+            </a:endParaRPr>
           </a:p>
         </p:txBody>
       </p:sp>
     </p:spTree>
     <p:extLst>
       <p:ext uri="{BB962C8B-B14F-4D97-AF65-F5344CB8AC3E}">
-        <p14:creationId xmlns:p14="http://schemas.microsoft.com/office/powerpoint/2010/main" val="3391963761"/>
+        <p14:creationId xmlns:p14="http://schemas.microsoft.com/office/powerpoint/2010/main" val="3868474940"/>
       </p:ext>
     </p:extLst>
   </p:cSld>
@@ -4257,6 +4224,137 @@
           <p:cNvPr id="2" name="Title 1">
             <a:extLst>
               <a:ext uri="{FF2B5EF4-FFF2-40B4-BE49-F238E27FC236}">
+                <a16:creationId xmlns:a16="http://schemas.microsoft.com/office/drawing/2014/main" id="{9D6F947A-8850-D5D1-5EEE-E7A99C3827EF}"/>
+              </a:ext>
+            </a:extLst>
+          </p:cNvPr>
+          <p:cNvSpPr>
+            <a:spLocks noGrp="1"/>
+          </p:cNvSpPr>
+          <p:nvPr>
+            <p:ph type="title"/>
+          </p:nvPr>
+        </p:nvSpPr>
+        <p:spPr/>
+        <p:txBody>
+          <a:bodyPr/>
+          <a:lstStyle/>
+          <a:p>
+            <a:r>
+              <a:rPr lang="en-GB" dirty="0"/>
+              <a:t>visuals</a:t>
+            </a:r>
+          </a:p>
+        </p:txBody>
+      </p:sp>
+      <p:sp>
+        <p:nvSpPr>
+          <p:cNvPr id="3" name="Content Placeholder 2">
+            <a:extLst>
+              <a:ext uri="{FF2B5EF4-FFF2-40B4-BE49-F238E27FC236}">
+                <a16:creationId xmlns:a16="http://schemas.microsoft.com/office/drawing/2014/main" id="{C4D6343C-155B-33F0-525A-DB102A4DCF08}"/>
+              </a:ext>
+            </a:extLst>
+          </p:cNvPr>
+          <p:cNvSpPr>
+            <a:spLocks noGrp="1"/>
+          </p:cNvSpPr>
+          <p:nvPr>
+            <p:ph idx="1"/>
+          </p:nvPr>
+        </p:nvSpPr>
+        <p:spPr/>
+        <p:txBody>
+          <a:bodyPr>
+            <a:normAutofit fontScale="92500" lnSpcReduction="10000"/>
+          </a:bodyPr>
+          <a:lstStyle/>
+          <a:p>
+            <a:r>
+              <a:rPr lang="en-GB" dirty="0"/>
+              <a:t>Heatmap of host against KEGG-pathway</a:t>
+            </a:r>
+          </a:p>
+          <a:p>
+            <a:pPr lvl="1"/>
+            <a:r>
+              <a:rPr lang="en-GB" dirty="0"/>
+              <a:t>Colour is based on number of samples which contain that KEGG pathway with that host</a:t>
+            </a:r>
+          </a:p>
+          <a:p>
+            <a:pPr lvl="1"/>
+            <a:r>
+              <a:rPr lang="en-GB" dirty="0"/>
+              <a:t>Brighter colours = more proportional samples with mammalian hosts have that pathway than is seen in fish, thus I conclude it is an adaptation to mammalian skin etc</a:t>
+            </a:r>
+          </a:p>
+          <a:p>
+            <a:r>
+              <a:rPr lang="en-GB" dirty="0"/>
+              <a:t>Heatmap of geography against KEGG-pathway</a:t>
+            </a:r>
+          </a:p>
+          <a:p>
+            <a:pPr lvl="1"/>
+            <a:r>
+              <a:rPr lang="en-GB" dirty="0"/>
+              <a:t>Colour is based on number of samples which contain that KEGG pathway for that region</a:t>
+            </a:r>
+          </a:p>
+          <a:p>
+            <a:pPr lvl="1"/>
+            <a:r>
+              <a:rPr lang="en-GB" dirty="0"/>
+              <a:t>Brighter colours = more proportional samples in NA than SA, thus I conclude it is an adaptation to NA etc</a:t>
+            </a:r>
+          </a:p>
+          <a:p>
+            <a:r>
+              <a:rPr lang="en-GB" dirty="0"/>
+              <a:t>This relates to how I want to do dashboards for both of these variables with more metadata on these and user-driven engagement stuff</a:t>
+            </a:r>
+          </a:p>
+          <a:p>
+            <a:endParaRPr lang="en-GB" dirty="0"/>
+          </a:p>
+        </p:txBody>
+      </p:sp>
+    </p:spTree>
+    <p:extLst>
+      <p:ext uri="{BB962C8B-B14F-4D97-AF65-F5344CB8AC3E}">
+        <p14:creationId xmlns:p14="http://schemas.microsoft.com/office/powerpoint/2010/main" val="3391963761"/>
+      </p:ext>
+    </p:extLst>
+  </p:cSld>
+  <p:clrMapOvr>
+    <a:masterClrMapping/>
+  </p:clrMapOvr>
+</p:sld>
+</file>
+
+<file path=ppt/slides/slide16.xml><?xml version="1.0" encoding="utf-8"?>
+<p:sld xmlns:a="http://schemas.openxmlformats.org/drawingml/2006/main" xmlns:r="http://schemas.openxmlformats.org/officeDocument/2006/relationships" xmlns:p="http://schemas.openxmlformats.org/presentationml/2006/main">
+  <p:cSld>
+    <p:spTree>
+      <p:nvGrpSpPr>
+        <p:cNvPr id="1" name=""/>
+        <p:cNvGrpSpPr/>
+        <p:nvPr/>
+      </p:nvGrpSpPr>
+      <p:grpSpPr>
+        <a:xfrm>
+          <a:off x="0" y="0"/>
+          <a:ext cx="0" cy="0"/>
+          <a:chOff x="0" y="0"/>
+          <a:chExt cx="0" cy="0"/>
+        </a:xfrm>
+      </p:grpSpPr>
+      <p:sp>
+        <p:nvSpPr>
+          <p:cNvPr id="2" name="Title 1">
+            <a:extLst>
+              <a:ext uri="{FF2B5EF4-FFF2-40B4-BE49-F238E27FC236}">
                 <a16:creationId xmlns:a16="http://schemas.microsoft.com/office/drawing/2014/main" id="{96F27633-1B42-F5CA-11A9-675C9D3DE43B}"/>
               </a:ext>
             </a:extLst>
@@ -4321,7 +4419,7 @@
 </p:sld>
 </file>
 
-<file path=ppt/slides/slide16.xml><?xml version="1.0" encoding="utf-8"?>
+<file path=ppt/slides/slide17.xml><?xml version="1.0" encoding="utf-8"?>
 <p:sld xmlns:a="http://schemas.openxmlformats.org/drawingml/2006/main" xmlns:r="http://schemas.openxmlformats.org/officeDocument/2006/relationships" xmlns:p="http://schemas.openxmlformats.org/presentationml/2006/main">
   <p:cSld>
     <p:spTree>
@@ -4651,7 +4749,7 @@
 </p:sld>
 </file>
 
-<file path=ppt/slides/slide17.xml><?xml version="1.0" encoding="utf-8"?>
+<file path=ppt/slides/slide18.xml><?xml version="1.0" encoding="utf-8"?>
 <p:sld xmlns:a="http://schemas.openxmlformats.org/drawingml/2006/main" xmlns:r="http://schemas.openxmlformats.org/officeDocument/2006/relationships" xmlns:p="http://schemas.openxmlformats.org/presentationml/2006/main">
   <p:cSld>
     <p:spTree>

</xml_diff>

<commit_message>
made dissertation R.proj area
</commit_message>
<xml_diff>
--- a/06_notebooks/dissertation_plan [Autosaved].pptx
+++ b/06_notebooks/dissertation_plan [Autosaved].pptx
@@ -14,15 +14,16 @@
     <p:sldId id="261" r:id="rId8"/>
     <p:sldId id="263" r:id="rId9"/>
     <p:sldId id="264" r:id="rId10"/>
-    <p:sldId id="265" r:id="rId11"/>
-    <p:sldId id="273" r:id="rId12"/>
-    <p:sldId id="266" r:id="rId13"/>
-    <p:sldId id="267" r:id="rId14"/>
-    <p:sldId id="259" r:id="rId15"/>
-    <p:sldId id="260" r:id="rId16"/>
-    <p:sldId id="262" r:id="rId17"/>
-    <p:sldId id="268" r:id="rId18"/>
-    <p:sldId id="269" r:id="rId19"/>
+    <p:sldId id="274" r:id="rId11"/>
+    <p:sldId id="265" r:id="rId12"/>
+    <p:sldId id="273" r:id="rId13"/>
+    <p:sldId id="266" r:id="rId14"/>
+    <p:sldId id="267" r:id="rId15"/>
+    <p:sldId id="259" r:id="rId16"/>
+    <p:sldId id="260" r:id="rId17"/>
+    <p:sldId id="262" r:id="rId18"/>
+    <p:sldId id="268" r:id="rId19"/>
+    <p:sldId id="269" r:id="rId20"/>
   </p:sldIdLst>
   <p:sldSz cx="12192000" cy="6858000"/>
   <p:notesSz cx="6858000" cy="9144000"/>
@@ -278,7 +279,7 @@
           <a:p>
             <a:fld id="{6A1B377F-046E-4B32-A3E7-5F51D184938C}" type="datetimeFigureOut">
               <a:rPr lang="en-GB" smtClean="0"/>
-              <a:t>13/06/2025</a:t>
+              <a:t>17/06/2025</a:t>
             </a:fld>
             <a:endParaRPr lang="en-GB"/>
           </a:p>
@@ -478,7 +479,7 @@
           <a:p>
             <a:fld id="{6A1B377F-046E-4B32-A3E7-5F51D184938C}" type="datetimeFigureOut">
               <a:rPr lang="en-GB" smtClean="0"/>
-              <a:t>13/06/2025</a:t>
+              <a:t>17/06/2025</a:t>
             </a:fld>
             <a:endParaRPr lang="en-GB"/>
           </a:p>
@@ -688,7 +689,7 @@
           <a:p>
             <a:fld id="{6A1B377F-046E-4B32-A3E7-5F51D184938C}" type="datetimeFigureOut">
               <a:rPr lang="en-GB" smtClean="0"/>
-              <a:t>13/06/2025</a:t>
+              <a:t>17/06/2025</a:t>
             </a:fld>
             <a:endParaRPr lang="en-GB"/>
           </a:p>
@@ -888,7 +889,7 @@
           <a:p>
             <a:fld id="{6A1B377F-046E-4B32-A3E7-5F51D184938C}" type="datetimeFigureOut">
               <a:rPr lang="en-GB" smtClean="0"/>
-              <a:t>13/06/2025</a:t>
+              <a:t>17/06/2025</a:t>
             </a:fld>
             <a:endParaRPr lang="en-GB"/>
           </a:p>
@@ -1164,7 +1165,7 @@
           <a:p>
             <a:fld id="{6A1B377F-046E-4B32-A3E7-5F51D184938C}" type="datetimeFigureOut">
               <a:rPr lang="en-GB" smtClean="0"/>
-              <a:t>13/06/2025</a:t>
+              <a:t>17/06/2025</a:t>
             </a:fld>
             <a:endParaRPr lang="en-GB"/>
           </a:p>
@@ -1432,7 +1433,7 @@
           <a:p>
             <a:fld id="{6A1B377F-046E-4B32-A3E7-5F51D184938C}" type="datetimeFigureOut">
               <a:rPr lang="en-GB" smtClean="0"/>
-              <a:t>13/06/2025</a:t>
+              <a:t>17/06/2025</a:t>
             </a:fld>
             <a:endParaRPr lang="en-GB"/>
           </a:p>
@@ -1847,7 +1848,7 @@
           <a:p>
             <a:fld id="{6A1B377F-046E-4B32-A3E7-5F51D184938C}" type="datetimeFigureOut">
               <a:rPr lang="en-GB" smtClean="0"/>
-              <a:t>13/06/2025</a:t>
+              <a:t>17/06/2025</a:t>
             </a:fld>
             <a:endParaRPr lang="en-GB"/>
           </a:p>
@@ -1989,7 +1990,7 @@
           <a:p>
             <a:fld id="{6A1B377F-046E-4B32-A3E7-5F51D184938C}" type="datetimeFigureOut">
               <a:rPr lang="en-GB" smtClean="0"/>
-              <a:t>13/06/2025</a:t>
+              <a:t>17/06/2025</a:t>
             </a:fld>
             <a:endParaRPr lang="en-GB"/>
           </a:p>
@@ -2102,7 +2103,7 @@
           <a:p>
             <a:fld id="{6A1B377F-046E-4B32-A3E7-5F51D184938C}" type="datetimeFigureOut">
               <a:rPr lang="en-GB" smtClean="0"/>
-              <a:t>13/06/2025</a:t>
+              <a:t>17/06/2025</a:t>
             </a:fld>
             <a:endParaRPr lang="en-GB"/>
           </a:p>
@@ -2415,7 +2416,7 @@
           <a:p>
             <a:fld id="{6A1B377F-046E-4B32-A3E7-5F51D184938C}" type="datetimeFigureOut">
               <a:rPr lang="en-GB" smtClean="0"/>
-              <a:t>13/06/2025</a:t>
+              <a:t>17/06/2025</a:t>
             </a:fld>
             <a:endParaRPr lang="en-GB"/>
           </a:p>
@@ -2704,7 +2705,7 @@
           <a:p>
             <a:fld id="{6A1B377F-046E-4B32-A3E7-5F51D184938C}" type="datetimeFigureOut">
               <a:rPr lang="en-GB" smtClean="0"/>
-              <a:t>13/06/2025</a:t>
+              <a:t>17/06/2025</a:t>
             </a:fld>
             <a:endParaRPr lang="en-GB"/>
           </a:p>
@@ -2947,7 +2948,7 @@
           <a:p>
             <a:fld id="{6A1B377F-046E-4B32-A3E7-5F51D184938C}" type="datetimeFigureOut">
               <a:rPr lang="en-GB" smtClean="0"/>
-              <a:t>13/06/2025</a:t>
+              <a:t>17/06/2025</a:t>
             </a:fld>
             <a:endParaRPr lang="en-GB"/>
           </a:p>
@@ -3463,7 +3464,7 @@
           <p:cNvPr id="2" name="Title 1">
             <a:extLst>
               <a:ext uri="{FF2B5EF4-FFF2-40B4-BE49-F238E27FC236}">
-                <a16:creationId xmlns:a16="http://schemas.microsoft.com/office/drawing/2014/main" id="{DEC7B767-31F4-A750-EA3C-58E878CC26AE}"/>
+                <a16:creationId xmlns:a16="http://schemas.microsoft.com/office/drawing/2014/main" id="{5551CEAA-9481-E73B-D5D4-6DBAEB852DEC}"/>
               </a:ext>
             </a:extLst>
           </p:cNvPr>
@@ -3481,7 +3482,7 @@
           <a:p>
             <a:r>
               <a:rPr lang="en-GB" dirty="0"/>
-              <a:t>Minor problems</a:t>
+              <a:t>Major Problems (3)</a:t>
             </a:r>
           </a:p>
         </p:txBody>
@@ -3491,7 +3492,7 @@
           <p:cNvPr id="3" name="Content Placeholder 2">
             <a:extLst>
               <a:ext uri="{FF2B5EF4-FFF2-40B4-BE49-F238E27FC236}">
-                <a16:creationId xmlns:a16="http://schemas.microsoft.com/office/drawing/2014/main" id="{2F781494-2410-08B9-1441-D71A5882E932}"/>
+                <a16:creationId xmlns:a16="http://schemas.microsoft.com/office/drawing/2014/main" id="{ACEFF39B-8B14-ED8B-3D51-96D679D6560C}"/>
               </a:ext>
             </a:extLst>
           </p:cNvPr>
@@ -3504,71 +3505,71 @@
         </p:nvSpPr>
         <p:spPr/>
         <p:txBody>
-          <a:bodyPr/>
-          <a:lstStyle/>
-          <a:p>
-            <a:r>
-              <a:rPr lang="en-GB" dirty="0"/>
-              <a:t>Host info is </a:t>
+          <a:bodyPr>
+            <a:normAutofit fontScale="77500" lnSpcReduction="20000"/>
+          </a:bodyPr>
+          <a:lstStyle/>
+          <a:p>
+            <a:r>
+              <a:rPr lang="en-GB" dirty="0"/>
+              <a:t>Problem 3: There is an acceptable amount of decent host information, as I concluded from answering MP1. However, this information is not acceptably distributed between taxa. Specifically, there is usually next to no amphibian or reptile hosts in the genera I have studied previously. Finding genera that have more even and diverse host information would be ideal for study, so that a wider range of hosts can be studied, which will improve analysis. In summary, the answer to MP1 was getting more annotations of the same genera. However, this does not answer the new problem that creates of (what if the amount of reptile and amphibian hosts does not improve to within acceptable margins?)</a:t>
+            </a:r>
+          </a:p>
+          <a:p>
+            <a:r>
+              <a:rPr lang="en-GB" dirty="0"/>
+              <a:t>Potential solutions 3: I may need fresh genera that have been previously studied in more diverse hosts. just read and look around for more bacterial genera to try</a:t>
+            </a:r>
+          </a:p>
+          <a:p>
+            <a:r>
+              <a:rPr lang="en-GB" dirty="0"/>
+              <a:t>Next steps 3: Once the pipeline is up and major problem 2 is </a:t>
             </a:r>
             <a:r>
               <a:rPr lang="en-GB" dirty="0" err="1"/>
-              <a:t>freetext</a:t>
-            </a:r>
-            <a:r>
-              <a:rPr lang="en-GB" dirty="0"/>
-              <a:t>, so will need to be messed with so it can be used, at scale mapping things like “homo </a:t>
+              <a:t>answerd</a:t>
+            </a:r>
+            <a:r>
+              <a:rPr lang="en-GB" dirty="0"/>
+              <a:t>, just keep trying genera until I hit one with a diverse host-set. Look into FTP (File Transfer Protocol) NCBI site. It has zip files on /</a:t>
             </a:r>
             <a:r>
               <a:rPr lang="en-GB" dirty="0" err="1"/>
-              <a:t>sapien</a:t>
-            </a:r>
-            <a:r>
-              <a:rPr lang="en-GB" dirty="0"/>
-              <a:t> = mammal” and “human = homo </a:t>
+              <a:t>biosample</a:t>
+            </a:r>
+            <a:r>
+              <a:rPr lang="en-GB" dirty="0"/>
+              <a:t>/</a:t>
             </a:r>
             <a:r>
               <a:rPr lang="en-GB" dirty="0" err="1"/>
-              <a:t>sapien</a:t>
-            </a:r>
-            <a:r>
-              <a:rPr lang="en-GB" dirty="0"/>
-              <a:t>” wants to be automated. This may just be something that has to be brute forced.</a:t>
-            </a:r>
-          </a:p>
-          <a:p>
-            <a:r>
-              <a:rPr lang="en-GB" dirty="0"/>
-              <a:t>Need to decide on format I want to write the dissertation in, as all of these problems are likely going to be Chapter 1, so I want to be writing it up as I go. </a:t>
-            </a:r>
-          </a:p>
-          <a:p>
-            <a:pPr lvl="1"/>
-            <a:r>
-              <a:rPr lang="en-GB" dirty="0"/>
-              <a:t>My choice at the moment is between Quarto book and Quarto manuscript.</a:t>
-            </a:r>
-          </a:p>
-          <a:p>
-            <a:r>
-              <a:rPr lang="en-GB" dirty="0"/>
-              <a:t>The whole GCF / GCA </a:t>
+              <a:t>biosample_set</a:t>
+            </a:r>
+            <a:r>
+              <a:rPr lang="en-GB" dirty="0"/>
+              <a:t> which may prove useful, and may require </a:t>
             </a:r>
             <a:r>
               <a:rPr lang="en-GB" dirty="0" err="1"/>
-              <a:t>debaucle</a:t>
-            </a:r>
-            <a:r>
-              <a:rPr lang="en-GB" dirty="0"/>
-              <a:t> </a:t>
-            </a:r>
+              <a:t>linux</a:t>
+            </a:r>
+            <a:r>
+              <a:rPr lang="en-GB" dirty="0"/>
+              <a:t> or python tools to </a:t>
+            </a:r>
+            <a:r>
+              <a:rPr lang="en-GB"/>
+              <a:t>properly explore.</a:t>
+            </a:r>
+            <a:endParaRPr lang="en-GB" dirty="0"/>
           </a:p>
         </p:txBody>
       </p:sp>
     </p:spTree>
     <p:extLst>
       <p:ext uri="{BB962C8B-B14F-4D97-AF65-F5344CB8AC3E}">
-        <p14:creationId xmlns:p14="http://schemas.microsoft.com/office/powerpoint/2010/main" val="1692796940"/>
+        <p14:creationId xmlns:p14="http://schemas.microsoft.com/office/powerpoint/2010/main" val="2886848296"/>
       </p:ext>
     </p:extLst>
   </p:cSld>
@@ -3600,7 +3601,7 @@
           <p:cNvPr id="2" name="Title 1">
             <a:extLst>
               <a:ext uri="{FF2B5EF4-FFF2-40B4-BE49-F238E27FC236}">
-                <a16:creationId xmlns:a16="http://schemas.microsoft.com/office/drawing/2014/main" id="{146254BF-20A7-E2D6-AAF3-A7840D985014}"/>
+                <a16:creationId xmlns:a16="http://schemas.microsoft.com/office/drawing/2014/main" id="{DEC7B767-31F4-A750-EA3C-58E878CC26AE}"/>
               </a:ext>
             </a:extLst>
           </p:cNvPr>
@@ -3618,7 +3619,7 @@
           <a:p>
             <a:r>
               <a:rPr lang="en-GB" dirty="0"/>
-              <a:t>More problems (?)</a:t>
+              <a:t>Minor problems</a:t>
             </a:r>
           </a:p>
         </p:txBody>
@@ -3628,7 +3629,7 @@
           <p:cNvPr id="3" name="Content Placeholder 2">
             <a:extLst>
               <a:ext uri="{FF2B5EF4-FFF2-40B4-BE49-F238E27FC236}">
-                <a16:creationId xmlns:a16="http://schemas.microsoft.com/office/drawing/2014/main" id="{D492E436-811C-27D4-F252-F94FBB03CD65}"/>
+                <a16:creationId xmlns:a16="http://schemas.microsoft.com/office/drawing/2014/main" id="{2F781494-2410-08B9-1441-D71A5882E932}"/>
               </a:ext>
             </a:extLst>
           </p:cNvPr>
@@ -3644,14 +3645,68 @@
           <a:bodyPr/>
           <a:lstStyle/>
           <a:p>
-            <a:endParaRPr lang="en-GB"/>
+            <a:r>
+              <a:rPr lang="en-GB" dirty="0"/>
+              <a:t>Host info is </a:t>
+            </a:r>
+            <a:r>
+              <a:rPr lang="en-GB" dirty="0" err="1"/>
+              <a:t>freetext</a:t>
+            </a:r>
+            <a:r>
+              <a:rPr lang="en-GB" dirty="0"/>
+              <a:t>, so will need to be messed with so it can be used, at scale mapping things like “homo </a:t>
+            </a:r>
+            <a:r>
+              <a:rPr lang="en-GB" dirty="0" err="1"/>
+              <a:t>sapien</a:t>
+            </a:r>
+            <a:r>
+              <a:rPr lang="en-GB" dirty="0"/>
+              <a:t> = mammal” and “human = homo </a:t>
+            </a:r>
+            <a:r>
+              <a:rPr lang="en-GB" dirty="0" err="1"/>
+              <a:t>sapien</a:t>
+            </a:r>
+            <a:r>
+              <a:rPr lang="en-GB" dirty="0"/>
+              <a:t>” wants to be automated. This may just be something that has to be brute forced.</a:t>
+            </a:r>
+          </a:p>
+          <a:p>
+            <a:r>
+              <a:rPr lang="en-GB" dirty="0"/>
+              <a:t>Need to decide on format I want to write the dissertation in, as all of these problems are likely going to be Chapter 1, so I want to be writing it up as I go. </a:t>
+            </a:r>
+          </a:p>
+          <a:p>
+            <a:pPr lvl="1"/>
+            <a:r>
+              <a:rPr lang="en-GB" dirty="0"/>
+              <a:t>My choice at the moment is between Quarto book and Quarto manuscript.</a:t>
+            </a:r>
+          </a:p>
+          <a:p>
+            <a:r>
+              <a:rPr lang="en-GB" dirty="0"/>
+              <a:t>The whole GCF / GCA </a:t>
+            </a:r>
+            <a:r>
+              <a:rPr lang="en-GB" dirty="0" err="1"/>
+              <a:t>debaucle</a:t>
+            </a:r>
+            <a:r>
+              <a:rPr lang="en-GB" dirty="0"/>
+              <a:t> </a:t>
+            </a:r>
           </a:p>
         </p:txBody>
       </p:sp>
     </p:spTree>
     <p:extLst>
       <p:ext uri="{BB962C8B-B14F-4D97-AF65-F5344CB8AC3E}">
-        <p14:creationId xmlns:p14="http://schemas.microsoft.com/office/powerpoint/2010/main" val="589666896"/>
+        <p14:creationId xmlns:p14="http://schemas.microsoft.com/office/powerpoint/2010/main" val="1692796940"/>
       </p:ext>
     </p:extLst>
   </p:cSld>
@@ -3683,7 +3738,7 @@
           <p:cNvPr id="2" name="Title 1">
             <a:extLst>
               <a:ext uri="{FF2B5EF4-FFF2-40B4-BE49-F238E27FC236}">
-                <a16:creationId xmlns:a16="http://schemas.microsoft.com/office/drawing/2014/main" id="{72487B3D-B8A0-7FA7-49C0-8744E7A390E8}"/>
+                <a16:creationId xmlns:a16="http://schemas.microsoft.com/office/drawing/2014/main" id="{146254BF-20A7-E2D6-AAF3-A7840D985014}"/>
               </a:ext>
             </a:extLst>
           </p:cNvPr>
@@ -3701,7 +3756,7 @@
           <a:p>
             <a:r>
               <a:rPr lang="en-GB" dirty="0"/>
-              <a:t>First steps – answer major problem 1</a:t>
+              <a:t>More problems (?)</a:t>
             </a:r>
           </a:p>
         </p:txBody>
@@ -3711,7 +3766,7 @@
           <p:cNvPr id="3" name="Content Placeholder 2">
             <a:extLst>
               <a:ext uri="{FF2B5EF4-FFF2-40B4-BE49-F238E27FC236}">
-                <a16:creationId xmlns:a16="http://schemas.microsoft.com/office/drawing/2014/main" id="{1A06D989-5BB2-1AAC-6CBB-AE98AE0DE476}"/>
+                <a16:creationId xmlns:a16="http://schemas.microsoft.com/office/drawing/2014/main" id="{D492E436-811C-27D4-F252-F94FBB03CD65}"/>
               </a:ext>
             </a:extLst>
           </p:cNvPr>
@@ -3724,121 +3779,17 @@
         </p:nvSpPr>
         <p:spPr/>
         <p:txBody>
-          <a:bodyPr>
-            <a:normAutofit fontScale="85000" lnSpcReduction="20000"/>
-          </a:bodyPr>
-          <a:lstStyle/>
-          <a:p>
-            <a:pPr marL="514350" indent="-514350">
-              <a:buFont typeface="+mj-lt"/>
-              <a:buAutoNum type="arabicPeriod"/>
-            </a:pPr>
-            <a:r>
-              <a:rPr lang="en-GB" dirty="0"/>
-              <a:t>Characterise host information currently held</a:t>
-            </a:r>
-          </a:p>
-          <a:p>
-            <a:pPr marL="971550" lvl="1" indent="-514350">
-              <a:buFont typeface="+mj-lt"/>
-              <a:buAutoNum type="arabicPeriod"/>
-            </a:pPr>
-            <a:r>
-              <a:rPr lang="en-GB" dirty="0"/>
-              <a:t>I have host info, I don’t think it looks good, but I don’t have anything else to compare it against, no metrics.</a:t>
-            </a:r>
-          </a:p>
-          <a:p>
-            <a:pPr marL="971550" lvl="1" indent="-514350">
-              <a:buFont typeface="+mj-lt"/>
-              <a:buAutoNum type="arabicPeriod"/>
-            </a:pPr>
-            <a:r>
-              <a:rPr lang="en-GB" dirty="0"/>
-              <a:t>Load metadata into SQL database for query,</a:t>
-            </a:r>
-          </a:p>
-          <a:p>
-            <a:pPr marL="971550" lvl="1" indent="-514350">
-              <a:buFont typeface="+mj-lt"/>
-              <a:buAutoNum type="arabicPeriod"/>
-            </a:pPr>
-            <a:r>
-              <a:rPr lang="en-GB" dirty="0"/>
-              <a:t>Manually categorise host information, because I cant think of a better way</a:t>
-            </a:r>
-          </a:p>
-          <a:p>
-            <a:pPr marL="971550" lvl="1" indent="-514350">
-              <a:buFont typeface="+mj-lt"/>
-              <a:buAutoNum type="arabicPeriod"/>
-            </a:pPr>
-            <a:r>
-              <a:rPr lang="en-GB" dirty="0"/>
-              <a:t>Produce some tables / a dashboard for information like “how many samples have hosts?”, “how many hosts are animal?”, “how many classes are represented?”</a:t>
-            </a:r>
-          </a:p>
-          <a:p>
-            <a:pPr marL="971550" lvl="1" indent="-514350">
-              <a:buFont typeface="+mj-lt"/>
-              <a:buAutoNum type="arabicPeriod"/>
-            </a:pPr>
-            <a:r>
-              <a:rPr lang="en-GB" dirty="0"/>
-              <a:t>This will give me metrics that I can compare new data with to help me see if new genera are improvements.</a:t>
-            </a:r>
-          </a:p>
-          <a:p>
-            <a:pPr marL="514350" indent="-514350">
-              <a:buFont typeface="+mj-lt"/>
-              <a:buAutoNum type="arabicPeriod"/>
-            </a:pPr>
-            <a:r>
-              <a:rPr lang="en-GB" dirty="0"/>
-              <a:t>Find good looking genus, I think the best to start with is </a:t>
-            </a:r>
-            <a:r>
-              <a:rPr lang="en-GB" i="1" dirty="0"/>
-              <a:t>E. coli</a:t>
-            </a:r>
-            <a:endParaRPr lang="en-GB" dirty="0"/>
-          </a:p>
-          <a:p>
-            <a:pPr marL="971550" lvl="1" indent="-514350">
-              <a:buFont typeface="+mj-lt"/>
-              <a:buAutoNum type="arabicPeriod"/>
-            </a:pPr>
-            <a:r>
-              <a:rPr lang="en-GB" dirty="0"/>
-              <a:t>Perform the same analysis described above and compare the metrics</a:t>
-            </a:r>
-          </a:p>
-          <a:p>
-            <a:pPr marL="971550" lvl="1" indent="-514350">
-              <a:buFont typeface="+mj-lt"/>
-              <a:buAutoNum type="arabicPeriod"/>
-            </a:pPr>
-            <a:r>
-              <a:rPr lang="en-GB" dirty="0"/>
-              <a:t>If it isn’t better, look for the genus with the most samples on NCBI and try some more until a good one is found.</a:t>
-            </a:r>
-          </a:p>
-          <a:p>
-            <a:pPr marL="971550" lvl="1" indent="-514350">
-              <a:buFont typeface="+mj-lt"/>
-              <a:buAutoNum type="arabicPeriod"/>
-            </a:pPr>
-            <a:r>
-              <a:rPr lang="en-GB" dirty="0"/>
-              <a:t>If E. coli is the one, then I hit problem 2, how do I get all the KEGG pathways in a non-painful manner</a:t>
-            </a:r>
+          <a:bodyPr/>
+          <a:lstStyle/>
+          <a:p>
+            <a:endParaRPr lang="en-GB"/>
           </a:p>
         </p:txBody>
       </p:sp>
     </p:spTree>
     <p:extLst>
       <p:ext uri="{BB962C8B-B14F-4D97-AF65-F5344CB8AC3E}">
-        <p14:creationId xmlns:p14="http://schemas.microsoft.com/office/powerpoint/2010/main" val="2037494248"/>
+        <p14:creationId xmlns:p14="http://schemas.microsoft.com/office/powerpoint/2010/main" val="589666896"/>
       </p:ext>
     </p:extLst>
   </p:cSld>
@@ -3870,7 +3821,7 @@
           <p:cNvPr id="2" name="Title 1">
             <a:extLst>
               <a:ext uri="{FF2B5EF4-FFF2-40B4-BE49-F238E27FC236}">
-                <a16:creationId xmlns:a16="http://schemas.microsoft.com/office/drawing/2014/main" id="{07D95F75-71B3-AC40-50DE-2AF524F8D368}"/>
+                <a16:creationId xmlns:a16="http://schemas.microsoft.com/office/drawing/2014/main" id="{72487B3D-B8A0-7FA7-49C0-8744E7A390E8}"/>
               </a:ext>
             </a:extLst>
           </p:cNvPr>
@@ -3888,7 +3839,7 @@
           <a:p>
             <a:r>
               <a:rPr lang="en-GB" dirty="0"/>
-              <a:t>First steps – answer major problem 2</a:t>
+              <a:t>First steps – answer major problem 1</a:t>
             </a:r>
           </a:p>
         </p:txBody>
@@ -3898,7 +3849,7 @@
           <p:cNvPr id="3" name="Content Placeholder 2">
             <a:extLst>
               <a:ext uri="{FF2B5EF4-FFF2-40B4-BE49-F238E27FC236}">
-                <a16:creationId xmlns:a16="http://schemas.microsoft.com/office/drawing/2014/main" id="{1B278A58-95F2-89E7-A233-DF748BE8271B}"/>
+                <a16:creationId xmlns:a16="http://schemas.microsoft.com/office/drawing/2014/main" id="{1A06D989-5BB2-1AAC-6CBB-AE98AE0DE476}"/>
               </a:ext>
             </a:extLst>
           </p:cNvPr>
@@ -3911,7 +3862,9 @@
         </p:nvSpPr>
         <p:spPr/>
         <p:txBody>
-          <a:bodyPr/>
+          <a:bodyPr>
+            <a:normAutofit fontScale="85000" lnSpcReduction="20000"/>
+          </a:bodyPr>
           <a:lstStyle/>
           <a:p>
             <a:pPr marL="514350" indent="-514350">
@@ -3920,23 +3873,57 @@
             </a:pPr>
             <a:r>
               <a:rPr lang="en-GB" dirty="0"/>
-              <a:t>I have the annotated protein </a:t>
-            </a:r>
-            <a:r>
-              <a:rPr lang="en-GB" dirty="0" err="1"/>
-              <a:t>fastas</a:t>
-            </a:r>
-            <a:r>
-              <a:rPr lang="en-GB" dirty="0"/>
-              <a:t> from </a:t>
-            </a:r>
-            <a:r>
-              <a:rPr lang="en-GB" dirty="0" err="1"/>
-              <a:t>EggNOG</a:t>
-            </a:r>
-            <a:r>
-              <a:rPr lang="en-GB" dirty="0"/>
-              <a:t>-mapper for my samples taken last year. </a:t>
+              <a:t>Characterise host information currently held</a:t>
+            </a:r>
+          </a:p>
+          <a:p>
+            <a:pPr marL="971550" lvl="1" indent="-514350">
+              <a:buFont typeface="+mj-lt"/>
+              <a:buAutoNum type="arabicPeriod"/>
+            </a:pPr>
+            <a:r>
+              <a:rPr lang="en-GB" dirty="0"/>
+              <a:t>I have host info, I don’t think it looks good, but I don’t have anything else to compare it against, no metrics.</a:t>
+            </a:r>
+          </a:p>
+          <a:p>
+            <a:pPr marL="971550" lvl="1" indent="-514350">
+              <a:buFont typeface="+mj-lt"/>
+              <a:buAutoNum type="arabicPeriod"/>
+            </a:pPr>
+            <a:r>
+              <a:rPr lang="en-GB" dirty="0"/>
+              <a:t>Load metadata into SQL database for query,</a:t>
+            </a:r>
+          </a:p>
+          <a:p>
+            <a:pPr marL="971550" lvl="1" indent="-514350">
+              <a:buFont typeface="+mj-lt"/>
+              <a:buAutoNum type="arabicPeriod"/>
+            </a:pPr>
+            <a:r>
+              <a:rPr lang="en-GB" dirty="0"/>
+              <a:t>Manually categorise host information, because I cant think of a better way</a:t>
+            </a:r>
+          </a:p>
+          <a:p>
+            <a:pPr marL="971550" lvl="1" indent="-514350">
+              <a:buFont typeface="+mj-lt"/>
+              <a:buAutoNum type="arabicPeriod"/>
+            </a:pPr>
+            <a:r>
+              <a:rPr lang="en-GB" dirty="0"/>
+              <a:t>Produce some tables / a dashboard for information like “how many samples have hosts?”, “how many hosts are animal?”, “how many classes are represented?”</a:t>
+            </a:r>
+          </a:p>
+          <a:p>
+            <a:pPr marL="971550" lvl="1" indent="-514350">
+              <a:buFont typeface="+mj-lt"/>
+              <a:buAutoNum type="arabicPeriod"/>
+            </a:pPr>
+            <a:r>
+              <a:rPr lang="en-GB" dirty="0"/>
+              <a:t>This will give me metrics that I can compare new data with to help me see if new genera are improvements.</a:t>
             </a:r>
           </a:p>
           <a:p>
@@ -3946,43 +3933,42 @@
             </a:pPr>
             <a:r>
               <a:rPr lang="en-GB" dirty="0"/>
-              <a:t>I can compare this KEGG information with KEGG information derived from whatever weird shortcut route Claude.ai helps me go down. </a:t>
-            </a:r>
-          </a:p>
-          <a:p>
-            <a:pPr marL="514350" indent="-514350">
+              <a:t>Find good looking genus, I think the best to start with is </a:t>
+            </a:r>
+            <a:r>
+              <a:rPr lang="en-GB" i="1" dirty="0"/>
+              <a:t>E. coli</a:t>
+            </a:r>
+            <a:endParaRPr lang="en-GB" dirty="0"/>
+          </a:p>
+          <a:p>
+            <a:pPr marL="971550" lvl="1" indent="-514350">
               <a:buFont typeface="+mj-lt"/>
               <a:buAutoNum type="arabicPeriod"/>
             </a:pPr>
             <a:r>
               <a:rPr lang="en-GB" dirty="0"/>
-              <a:t>If this demonstrates good similarity in results, I can use this hopefully much faster method to obtain KEGG pathway information for the genus selected in Major Problem 1</a:t>
-            </a:r>
-          </a:p>
-          <a:p>
-            <a:pPr marL="514350" indent="-514350">
+              <a:t>Perform the same analysis described above and compare the metrics</a:t>
+            </a:r>
+          </a:p>
+          <a:p>
+            <a:pPr marL="971550" lvl="1" indent="-514350">
               <a:buFont typeface="+mj-lt"/>
               <a:buAutoNum type="arabicPeriod"/>
             </a:pPr>
             <a:r>
               <a:rPr lang="en-GB" dirty="0"/>
-              <a:t>If it does not, likely </a:t>
-            </a:r>
-            <a:r>
-              <a:rPr lang="en-GB" dirty="0" err="1"/>
-              <a:t>EggNOG</a:t>
-            </a:r>
-            <a:r>
-              <a:rPr lang="en-GB" dirty="0"/>
-              <a:t>-mapper is the only viable solution and I will have to accept that the process will be </a:t>
-            </a:r>
-            <a:r>
-              <a:rPr lang="en-GB" dirty="0" err="1"/>
-              <a:t>grueling</a:t>
-            </a:r>
-            <a:r>
-              <a:rPr lang="en-GB" dirty="0"/>
-              <a:t>.</a:t>
+              <a:t>If it isn’t better, look for the genus with the most samples on NCBI and try some more until a good one is found.</a:t>
+            </a:r>
+          </a:p>
+          <a:p>
+            <a:pPr marL="971550" lvl="1" indent="-514350">
+              <a:buFont typeface="+mj-lt"/>
+              <a:buAutoNum type="arabicPeriod"/>
+            </a:pPr>
+            <a:r>
+              <a:rPr lang="en-GB" dirty="0"/>
+              <a:t>If E. coli is the one, then I hit problem 2, how do I get all the KEGG pathways in a non-painful manner</a:t>
             </a:r>
           </a:p>
         </p:txBody>
@@ -3990,7 +3976,7 @@
     </p:spTree>
     <p:extLst>
       <p:ext uri="{BB962C8B-B14F-4D97-AF65-F5344CB8AC3E}">
-        <p14:creationId xmlns:p14="http://schemas.microsoft.com/office/powerpoint/2010/main" val="1552344799"/>
+        <p14:creationId xmlns:p14="http://schemas.microsoft.com/office/powerpoint/2010/main" val="2037494248"/>
       </p:ext>
     </p:extLst>
   </p:cSld>
@@ -4022,7 +4008,7 @@
           <p:cNvPr id="2" name="Title 1">
             <a:extLst>
               <a:ext uri="{FF2B5EF4-FFF2-40B4-BE49-F238E27FC236}">
-                <a16:creationId xmlns:a16="http://schemas.microsoft.com/office/drawing/2014/main" id="{B1E5CCA1-F5BC-ABBA-608D-6DF33AE4AD07}"/>
+                <a16:creationId xmlns:a16="http://schemas.microsoft.com/office/drawing/2014/main" id="{07D95F75-71B3-AC40-50DE-2AF524F8D368}"/>
               </a:ext>
             </a:extLst>
           </p:cNvPr>
@@ -4040,7 +4026,7 @@
           <a:p>
             <a:r>
               <a:rPr lang="en-GB" dirty="0"/>
-              <a:t>What I want the outputs to look like</a:t>
+              <a:t>First steps – answer major problem 2</a:t>
             </a:r>
           </a:p>
         </p:txBody>
@@ -4050,7 +4036,7 @@
           <p:cNvPr id="3" name="Content Placeholder 2">
             <a:extLst>
               <a:ext uri="{FF2B5EF4-FFF2-40B4-BE49-F238E27FC236}">
-                <a16:creationId xmlns:a16="http://schemas.microsoft.com/office/drawing/2014/main" id="{16D75308-A4C6-08E4-F14E-076DB8422302}"/>
+                <a16:creationId xmlns:a16="http://schemas.microsoft.com/office/drawing/2014/main" id="{1B278A58-95F2-89E7-A233-DF748BE8271B}"/>
               </a:ext>
             </a:extLst>
           </p:cNvPr>
@@ -4063,136 +4049,86 @@
         </p:nvSpPr>
         <p:spPr/>
         <p:txBody>
-          <a:bodyPr>
-            <a:normAutofit fontScale="92500" lnSpcReduction="10000"/>
-          </a:bodyPr>
-          <a:lstStyle/>
-          <a:p>
-            <a:r>
-              <a:rPr lang="en-GB" dirty="0"/>
-              <a:t>What is needed to answer the hypothesis?</a:t>
-            </a:r>
-          </a:p>
-          <a:p>
-            <a:pPr lvl="1"/>
-            <a:r>
-              <a:rPr lang="en-US" sz="1600" dirty="0">
-                <a:effectLst/>
-                <a:latin typeface="Aptos" panose="020B0004020202020204" pitchFamily="34" charset="0"/>
-                <a:ea typeface="Aptos" panose="020B0004020202020204" pitchFamily="34" charset="0"/>
-                <a:cs typeface="Times New Roman" panose="02020603050405020304" pitchFamily="18" charset="0"/>
-              </a:rPr>
-              <a:t>Do bacterial species and genera significantly differ in gene function, beyond what would be expected from evolutionary history alone, such as by host environment or geographic location? Yes, I expect they adapt</a:t>
-            </a:r>
-            <a:endParaRPr lang="en-GB" sz="1600" dirty="0">
-              <a:effectLst/>
-              <a:latin typeface="Aptos" panose="020B0004020202020204" pitchFamily="34" charset="0"/>
-              <a:ea typeface="Aptos" panose="020B0004020202020204" pitchFamily="34" charset="0"/>
-              <a:cs typeface="Times New Roman" panose="02020603050405020304" pitchFamily="18" charset="0"/>
-            </a:endParaRPr>
-          </a:p>
-          <a:p>
-            <a:r>
-              <a:rPr lang="en-GB" sz="2400" dirty="0"/>
-              <a:t>Visuals to display results</a:t>
-            </a:r>
-          </a:p>
-          <a:p>
-            <a:pPr lvl="1"/>
-            <a:r>
-              <a:rPr lang="en-GB" sz="2000" dirty="0">
-                <a:effectLst/>
-                <a:ea typeface="Times New Roman" panose="02020603050405020304" pitchFamily="18" charset="0"/>
-                <a:cs typeface="Times New Roman" panose="02020603050405020304" pitchFamily="18" charset="0"/>
-              </a:rPr>
-              <a:t>Show trends where there are functional differences where there are correlations with </a:t>
-            </a:r>
-            <a:r>
-              <a:rPr lang="en-GB" sz="2000" dirty="0">
-                <a:ea typeface="Times New Roman" panose="02020603050405020304" pitchFamily="18" charset="0"/>
-                <a:cs typeface="Times New Roman" panose="02020603050405020304" pitchFamily="18" charset="0"/>
-              </a:rPr>
-              <a:t>different hosts or geographies</a:t>
-            </a:r>
-          </a:p>
-          <a:p>
-            <a:pPr lvl="2"/>
-            <a:r>
-              <a:rPr lang="en-GB" sz="1600" dirty="0">
-                <a:effectLst/>
-                <a:ea typeface="Times New Roman" panose="02020603050405020304" pitchFamily="18" charset="0"/>
-                <a:cs typeface="Times New Roman" panose="02020603050405020304" pitchFamily="18" charset="0"/>
-              </a:rPr>
-              <a:t>Like with geography or host</a:t>
-            </a:r>
-          </a:p>
-          <a:p>
-            <a:r>
-              <a:rPr lang="en-GB" sz="2400" dirty="0">
-                <a:effectLst/>
-                <a:ea typeface="Times New Roman" panose="02020603050405020304" pitchFamily="18" charset="0"/>
-                <a:cs typeface="Times New Roman" panose="02020603050405020304" pitchFamily="18" charset="0"/>
-              </a:rPr>
-              <a:t>Also, need data of just evolution and phylogeny to compare against, so I can see if a change is by the factor, or just through evo differences.</a:t>
-            </a:r>
-          </a:p>
-          <a:p>
-            <a:pPr lvl="1"/>
-            <a:r>
-              <a:rPr lang="en-GB" sz="2000" dirty="0">
-                <a:effectLst/>
-                <a:ea typeface="Times New Roman" panose="02020603050405020304" pitchFamily="18" charset="0"/>
-                <a:cs typeface="Times New Roman" panose="02020603050405020304" pitchFamily="18" charset="0"/>
-              </a:rPr>
-              <a:t>Possibly more </a:t>
-            </a:r>
-            <a:r>
-              <a:rPr lang="en-GB" sz="2000" dirty="0" err="1">
-                <a:effectLst/>
-                <a:ea typeface="Times New Roman" panose="02020603050405020304" pitchFamily="18" charset="0"/>
-                <a:cs typeface="Times New Roman" panose="02020603050405020304" pitchFamily="18" charset="0"/>
-              </a:rPr>
-              <a:t>phylo</a:t>
-            </a:r>
-            <a:r>
-              <a:rPr lang="en-GB" sz="2000" dirty="0">
-                <a:effectLst/>
-                <a:ea typeface="Times New Roman" panose="02020603050405020304" pitchFamily="18" charset="0"/>
-                <a:cs typeface="Times New Roman" panose="02020603050405020304" pitchFamily="18" charset="0"/>
-              </a:rPr>
-              <a:t> trees, a heatmap just for evo diffs, like the one from Y2</a:t>
-            </a:r>
-          </a:p>
-          <a:p>
-            <a:pPr lvl="1"/>
-            <a:r>
-              <a:rPr lang="en-GB" sz="2000" dirty="0">
-                <a:ea typeface="Times New Roman" panose="02020603050405020304" pitchFamily="18" charset="0"/>
-                <a:cs typeface="Times New Roman" panose="02020603050405020304" pitchFamily="18" charset="0"/>
-              </a:rPr>
-              <a:t>Maybe give this data its own dashboard</a:t>
-            </a:r>
-          </a:p>
-          <a:p>
-            <a:r>
-              <a:rPr lang="en-GB" sz="2400" dirty="0">
-                <a:ea typeface="Times New Roman" panose="02020603050405020304" pitchFamily="18" charset="0"/>
-                <a:cs typeface="Times New Roman" panose="02020603050405020304" pitchFamily="18" charset="0"/>
-              </a:rPr>
-              <a:t>Maybe like a database of all the differences, some way to compare all the differences found in the heatmaps. Run different queries on the same subjects. Some final way of combining the data from the three sources into one comparison.</a:t>
-            </a:r>
-            <a:endParaRPr lang="en-GB" sz="2400" dirty="0">
-              <a:effectLst/>
-              <a:ea typeface="Times New Roman" panose="02020603050405020304" pitchFamily="18" charset="0"/>
-              <a:cs typeface="Times New Roman" panose="02020603050405020304" pitchFamily="18" charset="0"/>
-            </a:endParaRPr>
+          <a:bodyPr/>
+          <a:lstStyle/>
+          <a:p>
+            <a:pPr marL="514350" indent="-514350">
+              <a:buFont typeface="+mj-lt"/>
+              <a:buAutoNum type="arabicPeriod"/>
+            </a:pPr>
+            <a:r>
+              <a:rPr lang="en-GB" dirty="0"/>
+              <a:t>I have the annotated protein </a:t>
+            </a:r>
+            <a:r>
+              <a:rPr lang="en-GB" dirty="0" err="1"/>
+              <a:t>fastas</a:t>
+            </a:r>
+            <a:r>
+              <a:rPr lang="en-GB" dirty="0"/>
+              <a:t> from </a:t>
+            </a:r>
+            <a:r>
+              <a:rPr lang="en-GB" dirty="0" err="1"/>
+              <a:t>EggNOG</a:t>
+            </a:r>
+            <a:r>
+              <a:rPr lang="en-GB" dirty="0"/>
+              <a:t>-mapper for my samples taken last year. </a:t>
+            </a:r>
+          </a:p>
+          <a:p>
+            <a:pPr marL="514350" indent="-514350">
+              <a:buFont typeface="+mj-lt"/>
+              <a:buAutoNum type="arabicPeriod"/>
+            </a:pPr>
+            <a:r>
+              <a:rPr lang="en-GB" dirty="0"/>
+              <a:t>I can compare this KEGG information with KEGG information derived from whatever weird shortcut route Claude.ai helps me go down. </a:t>
+            </a:r>
+          </a:p>
+          <a:p>
+            <a:pPr marL="514350" indent="-514350">
+              <a:buFont typeface="+mj-lt"/>
+              <a:buAutoNum type="arabicPeriod"/>
+            </a:pPr>
+            <a:r>
+              <a:rPr lang="en-GB" dirty="0"/>
+              <a:t>If this demonstrates good similarity in results, I can use this hopefully much faster method to obtain KEGG pathway information for the genus selected in Major Problem 1</a:t>
+            </a:r>
+          </a:p>
+          <a:p>
+            <a:pPr marL="514350" indent="-514350">
+              <a:buFont typeface="+mj-lt"/>
+              <a:buAutoNum type="arabicPeriod"/>
+            </a:pPr>
+            <a:r>
+              <a:rPr lang="en-GB" dirty="0"/>
+              <a:t>If it does not, likely </a:t>
+            </a:r>
+            <a:r>
+              <a:rPr lang="en-GB" dirty="0" err="1"/>
+              <a:t>EggNOG</a:t>
+            </a:r>
+            <a:r>
+              <a:rPr lang="en-GB" dirty="0"/>
+              <a:t>-mapper is the only viable solution and I will have to accept that the process will be </a:t>
+            </a:r>
+            <a:r>
+              <a:rPr lang="en-GB" dirty="0" err="1"/>
+              <a:t>grueling</a:t>
+            </a:r>
+            <a:r>
+              <a:rPr lang="en-GB" dirty="0"/>
+              <a:t>.</a:t>
+            </a:r>
           </a:p>
         </p:txBody>
       </p:sp>
     </p:spTree>
     <p:extLst>
       <p:ext uri="{BB962C8B-B14F-4D97-AF65-F5344CB8AC3E}">
-        <p14:creationId xmlns:p14="http://schemas.microsoft.com/office/powerpoint/2010/main" val="3868474940"/>
+        <p14:creationId xmlns:p14="http://schemas.microsoft.com/office/powerpoint/2010/main" val="1552344799"/>
       </p:ext>
     </p:extLst>
   </p:cSld>
@@ -4224,7 +4160,7 @@
           <p:cNvPr id="2" name="Title 1">
             <a:extLst>
               <a:ext uri="{FF2B5EF4-FFF2-40B4-BE49-F238E27FC236}">
-                <a16:creationId xmlns:a16="http://schemas.microsoft.com/office/drawing/2014/main" id="{9D6F947A-8850-D5D1-5EEE-E7A99C3827EF}"/>
+                <a16:creationId xmlns:a16="http://schemas.microsoft.com/office/drawing/2014/main" id="{B1E5CCA1-F5BC-ABBA-608D-6DF33AE4AD07}"/>
               </a:ext>
             </a:extLst>
           </p:cNvPr>
@@ -4242,7 +4178,7 @@
           <a:p>
             <a:r>
               <a:rPr lang="en-GB" dirty="0"/>
-              <a:t>visuals</a:t>
+              <a:t>What I want the outputs to look like</a:t>
             </a:r>
           </a:p>
         </p:txBody>
@@ -4252,7 +4188,7 @@
           <p:cNvPr id="3" name="Content Placeholder 2">
             <a:extLst>
               <a:ext uri="{FF2B5EF4-FFF2-40B4-BE49-F238E27FC236}">
-                <a16:creationId xmlns:a16="http://schemas.microsoft.com/office/drawing/2014/main" id="{C4D6343C-155B-33F0-525A-DB102A4DCF08}"/>
+                <a16:creationId xmlns:a16="http://schemas.microsoft.com/office/drawing/2014/main" id="{16D75308-A4C6-08E4-F14E-076DB8422302}"/>
               </a:ext>
             </a:extLst>
           </p:cNvPr>
@@ -4272,58 +4208,129 @@
           <a:p>
             <a:r>
               <a:rPr lang="en-GB" dirty="0"/>
-              <a:t>Heatmap of host against KEGG-pathway</a:t>
+              <a:t>What is needed to answer the hypothesis?</a:t>
             </a:r>
           </a:p>
           <a:p>
             <a:pPr lvl="1"/>
             <a:r>
-              <a:rPr lang="en-GB" dirty="0"/>
-              <a:t>Colour is based on number of samples which contain that KEGG pathway with that host</a:t>
+              <a:rPr lang="en-US" sz="1600" dirty="0">
+                <a:effectLst/>
+                <a:latin typeface="Aptos" panose="020B0004020202020204" pitchFamily="34" charset="0"/>
+                <a:ea typeface="Aptos" panose="020B0004020202020204" pitchFamily="34" charset="0"/>
+                <a:cs typeface="Times New Roman" panose="02020603050405020304" pitchFamily="18" charset="0"/>
+              </a:rPr>
+              <a:t>Do bacterial species and genera significantly differ in gene function, beyond what would be expected from evolutionary history alone, such as by host environment or geographic location? Yes, I expect they adapt</a:t>
+            </a:r>
+            <a:endParaRPr lang="en-GB" sz="1600" dirty="0">
+              <a:effectLst/>
+              <a:latin typeface="Aptos" panose="020B0004020202020204" pitchFamily="34" charset="0"/>
+              <a:ea typeface="Aptos" panose="020B0004020202020204" pitchFamily="34" charset="0"/>
+              <a:cs typeface="Times New Roman" panose="02020603050405020304" pitchFamily="18" charset="0"/>
+            </a:endParaRPr>
+          </a:p>
+          <a:p>
+            <a:r>
+              <a:rPr lang="en-GB" sz="2400" dirty="0"/>
+              <a:t>Visuals to display results</a:t>
             </a:r>
           </a:p>
           <a:p>
             <a:pPr lvl="1"/>
             <a:r>
-              <a:rPr lang="en-GB" dirty="0"/>
-              <a:t>Brighter colours = more proportional samples with mammalian hosts have that pathway than is seen in fish, thus I conclude it is an adaptation to mammalian skin etc</a:t>
-            </a:r>
-          </a:p>
-          <a:p>
-            <a:r>
-              <a:rPr lang="en-GB" dirty="0"/>
-              <a:t>Heatmap of geography against KEGG-pathway</a:t>
+              <a:rPr lang="en-GB" sz="2000" dirty="0">
+                <a:effectLst/>
+                <a:ea typeface="Times New Roman" panose="02020603050405020304" pitchFamily="18" charset="0"/>
+                <a:cs typeface="Times New Roman" panose="02020603050405020304" pitchFamily="18" charset="0"/>
+              </a:rPr>
+              <a:t>Show trends where there are functional differences where there are correlations with </a:t>
+            </a:r>
+            <a:r>
+              <a:rPr lang="en-GB" sz="2000" dirty="0">
+                <a:ea typeface="Times New Roman" panose="02020603050405020304" pitchFamily="18" charset="0"/>
+                <a:cs typeface="Times New Roman" panose="02020603050405020304" pitchFamily="18" charset="0"/>
+              </a:rPr>
+              <a:t>different hosts or geographies</a:t>
+            </a:r>
+          </a:p>
+          <a:p>
+            <a:pPr lvl="2"/>
+            <a:r>
+              <a:rPr lang="en-GB" sz="1600" dirty="0">
+                <a:effectLst/>
+                <a:ea typeface="Times New Roman" panose="02020603050405020304" pitchFamily="18" charset="0"/>
+                <a:cs typeface="Times New Roman" panose="02020603050405020304" pitchFamily="18" charset="0"/>
+              </a:rPr>
+              <a:t>Like with geography or host</a:t>
+            </a:r>
+          </a:p>
+          <a:p>
+            <a:r>
+              <a:rPr lang="en-GB" sz="2400" dirty="0">
+                <a:effectLst/>
+                <a:ea typeface="Times New Roman" panose="02020603050405020304" pitchFamily="18" charset="0"/>
+                <a:cs typeface="Times New Roman" panose="02020603050405020304" pitchFamily="18" charset="0"/>
+              </a:rPr>
+              <a:t>Also, need data of just evolution and phylogeny to compare against, so I can see if a change is by the factor, or just through evo differences.</a:t>
             </a:r>
           </a:p>
           <a:p>
             <a:pPr lvl="1"/>
             <a:r>
-              <a:rPr lang="en-GB" dirty="0"/>
-              <a:t>Colour is based on number of samples which contain that KEGG pathway for that region</a:t>
+              <a:rPr lang="en-GB" sz="2000" dirty="0">
+                <a:effectLst/>
+                <a:ea typeface="Times New Roman" panose="02020603050405020304" pitchFamily="18" charset="0"/>
+                <a:cs typeface="Times New Roman" panose="02020603050405020304" pitchFamily="18" charset="0"/>
+              </a:rPr>
+              <a:t>Possibly more </a:t>
+            </a:r>
+            <a:r>
+              <a:rPr lang="en-GB" sz="2000" dirty="0" err="1">
+                <a:effectLst/>
+                <a:ea typeface="Times New Roman" panose="02020603050405020304" pitchFamily="18" charset="0"/>
+                <a:cs typeface="Times New Roman" panose="02020603050405020304" pitchFamily="18" charset="0"/>
+              </a:rPr>
+              <a:t>phylo</a:t>
+            </a:r>
+            <a:r>
+              <a:rPr lang="en-GB" sz="2000" dirty="0">
+                <a:effectLst/>
+                <a:ea typeface="Times New Roman" panose="02020603050405020304" pitchFamily="18" charset="0"/>
+                <a:cs typeface="Times New Roman" panose="02020603050405020304" pitchFamily="18" charset="0"/>
+              </a:rPr>
+              <a:t> trees, a heatmap just for evo diffs, like the one from Y2</a:t>
             </a:r>
           </a:p>
           <a:p>
             <a:pPr lvl="1"/>
             <a:r>
-              <a:rPr lang="en-GB" dirty="0"/>
-              <a:t>Brighter colours = more proportional samples in NA than SA, thus I conclude it is an adaptation to NA etc</a:t>
-            </a:r>
-          </a:p>
-          <a:p>
-            <a:r>
-              <a:rPr lang="en-GB" dirty="0"/>
-              <a:t>This relates to how I want to do dashboards for both of these variables with more metadata on these and user-driven engagement stuff</a:t>
-            </a:r>
-          </a:p>
-          <a:p>
-            <a:endParaRPr lang="en-GB" dirty="0"/>
+              <a:rPr lang="en-GB" sz="2000" dirty="0">
+                <a:ea typeface="Times New Roman" panose="02020603050405020304" pitchFamily="18" charset="0"/>
+                <a:cs typeface="Times New Roman" panose="02020603050405020304" pitchFamily="18" charset="0"/>
+              </a:rPr>
+              <a:t>Maybe give this data its own dashboard</a:t>
+            </a:r>
+          </a:p>
+          <a:p>
+            <a:r>
+              <a:rPr lang="en-GB" sz="2400" dirty="0">
+                <a:ea typeface="Times New Roman" panose="02020603050405020304" pitchFamily="18" charset="0"/>
+                <a:cs typeface="Times New Roman" panose="02020603050405020304" pitchFamily="18" charset="0"/>
+              </a:rPr>
+              <a:t>Maybe like a database of all the differences, some way to compare all the differences found in the heatmaps. Run different queries on the same subjects. Some final way of combining the data from the three sources into one comparison.</a:t>
+            </a:r>
+            <a:endParaRPr lang="en-GB" sz="2400" dirty="0">
+              <a:effectLst/>
+              <a:ea typeface="Times New Roman" panose="02020603050405020304" pitchFamily="18" charset="0"/>
+              <a:cs typeface="Times New Roman" panose="02020603050405020304" pitchFamily="18" charset="0"/>
+            </a:endParaRPr>
           </a:p>
         </p:txBody>
       </p:sp>
     </p:spTree>
     <p:extLst>
       <p:ext uri="{BB962C8B-B14F-4D97-AF65-F5344CB8AC3E}">
-        <p14:creationId xmlns:p14="http://schemas.microsoft.com/office/powerpoint/2010/main" val="3391963761"/>
+        <p14:creationId xmlns:p14="http://schemas.microsoft.com/office/powerpoint/2010/main" val="3868474940"/>
       </p:ext>
     </p:extLst>
   </p:cSld>
@@ -4355,6 +4362,137 @@
           <p:cNvPr id="2" name="Title 1">
             <a:extLst>
               <a:ext uri="{FF2B5EF4-FFF2-40B4-BE49-F238E27FC236}">
+                <a16:creationId xmlns:a16="http://schemas.microsoft.com/office/drawing/2014/main" id="{9D6F947A-8850-D5D1-5EEE-E7A99C3827EF}"/>
+              </a:ext>
+            </a:extLst>
+          </p:cNvPr>
+          <p:cNvSpPr>
+            <a:spLocks noGrp="1"/>
+          </p:cNvSpPr>
+          <p:nvPr>
+            <p:ph type="title"/>
+          </p:nvPr>
+        </p:nvSpPr>
+        <p:spPr/>
+        <p:txBody>
+          <a:bodyPr/>
+          <a:lstStyle/>
+          <a:p>
+            <a:r>
+              <a:rPr lang="en-GB" dirty="0"/>
+              <a:t>visuals</a:t>
+            </a:r>
+          </a:p>
+        </p:txBody>
+      </p:sp>
+      <p:sp>
+        <p:nvSpPr>
+          <p:cNvPr id="3" name="Content Placeholder 2">
+            <a:extLst>
+              <a:ext uri="{FF2B5EF4-FFF2-40B4-BE49-F238E27FC236}">
+                <a16:creationId xmlns:a16="http://schemas.microsoft.com/office/drawing/2014/main" id="{C4D6343C-155B-33F0-525A-DB102A4DCF08}"/>
+              </a:ext>
+            </a:extLst>
+          </p:cNvPr>
+          <p:cNvSpPr>
+            <a:spLocks noGrp="1"/>
+          </p:cNvSpPr>
+          <p:nvPr>
+            <p:ph idx="1"/>
+          </p:nvPr>
+        </p:nvSpPr>
+        <p:spPr/>
+        <p:txBody>
+          <a:bodyPr>
+            <a:normAutofit fontScale="92500" lnSpcReduction="10000"/>
+          </a:bodyPr>
+          <a:lstStyle/>
+          <a:p>
+            <a:r>
+              <a:rPr lang="en-GB" dirty="0"/>
+              <a:t>Heatmap of host against KEGG-pathway</a:t>
+            </a:r>
+          </a:p>
+          <a:p>
+            <a:pPr lvl="1"/>
+            <a:r>
+              <a:rPr lang="en-GB" dirty="0"/>
+              <a:t>Colour is based on number of samples which contain that KEGG pathway with that host</a:t>
+            </a:r>
+          </a:p>
+          <a:p>
+            <a:pPr lvl="1"/>
+            <a:r>
+              <a:rPr lang="en-GB" dirty="0"/>
+              <a:t>Brighter colours = more proportional samples with mammalian hosts have that pathway than is seen in fish, thus I conclude it is an adaptation to mammalian skin etc</a:t>
+            </a:r>
+          </a:p>
+          <a:p>
+            <a:r>
+              <a:rPr lang="en-GB" dirty="0"/>
+              <a:t>Heatmap of geography against KEGG-pathway</a:t>
+            </a:r>
+          </a:p>
+          <a:p>
+            <a:pPr lvl="1"/>
+            <a:r>
+              <a:rPr lang="en-GB" dirty="0"/>
+              <a:t>Colour is based on number of samples which contain that KEGG pathway for that region</a:t>
+            </a:r>
+          </a:p>
+          <a:p>
+            <a:pPr lvl="1"/>
+            <a:r>
+              <a:rPr lang="en-GB" dirty="0"/>
+              <a:t>Brighter colours = more proportional samples in NA than SA, thus I conclude it is an adaptation to NA etc</a:t>
+            </a:r>
+          </a:p>
+          <a:p>
+            <a:r>
+              <a:rPr lang="en-GB" dirty="0"/>
+              <a:t>This relates to how I want to do dashboards for both of these variables with more metadata on these and user-driven engagement stuff</a:t>
+            </a:r>
+          </a:p>
+          <a:p>
+            <a:endParaRPr lang="en-GB" dirty="0"/>
+          </a:p>
+        </p:txBody>
+      </p:sp>
+    </p:spTree>
+    <p:extLst>
+      <p:ext uri="{BB962C8B-B14F-4D97-AF65-F5344CB8AC3E}">
+        <p14:creationId xmlns:p14="http://schemas.microsoft.com/office/powerpoint/2010/main" val="3391963761"/>
+      </p:ext>
+    </p:extLst>
+  </p:cSld>
+  <p:clrMapOvr>
+    <a:masterClrMapping/>
+  </p:clrMapOvr>
+</p:sld>
+</file>
+
+<file path=ppt/slides/slide17.xml><?xml version="1.0" encoding="utf-8"?>
+<p:sld xmlns:a="http://schemas.openxmlformats.org/drawingml/2006/main" xmlns:r="http://schemas.openxmlformats.org/officeDocument/2006/relationships" xmlns:p="http://schemas.openxmlformats.org/presentationml/2006/main">
+  <p:cSld>
+    <p:spTree>
+      <p:nvGrpSpPr>
+        <p:cNvPr id="1" name=""/>
+        <p:cNvGrpSpPr/>
+        <p:nvPr/>
+      </p:nvGrpSpPr>
+      <p:grpSpPr>
+        <a:xfrm>
+          <a:off x="0" y="0"/>
+          <a:ext cx="0" cy="0"/>
+          <a:chOff x="0" y="0"/>
+          <a:chExt cx="0" cy="0"/>
+        </a:xfrm>
+      </p:grpSpPr>
+      <p:sp>
+        <p:nvSpPr>
+          <p:cNvPr id="2" name="Title 1">
+            <a:extLst>
+              <a:ext uri="{FF2B5EF4-FFF2-40B4-BE49-F238E27FC236}">
                 <a16:creationId xmlns:a16="http://schemas.microsoft.com/office/drawing/2014/main" id="{96F27633-1B42-F5CA-11A9-675C9D3DE43B}"/>
               </a:ext>
             </a:extLst>
@@ -4419,7 +4557,7 @@
 </p:sld>
 </file>
 
-<file path=ppt/slides/slide17.xml><?xml version="1.0" encoding="utf-8"?>
+<file path=ppt/slides/slide18.xml><?xml version="1.0" encoding="utf-8"?>
 <p:sld xmlns:a="http://schemas.openxmlformats.org/drawingml/2006/main" xmlns:r="http://schemas.openxmlformats.org/officeDocument/2006/relationships" xmlns:p="http://schemas.openxmlformats.org/presentationml/2006/main">
   <p:cSld>
     <p:spTree>
@@ -4749,7 +4887,7 @@
 </p:sld>
 </file>
 
-<file path=ppt/slides/slide18.xml><?xml version="1.0" encoding="utf-8"?>
+<file path=ppt/slides/slide19.xml><?xml version="1.0" encoding="utf-8"?>
 <p:sld xmlns:a="http://schemas.openxmlformats.org/drawingml/2006/main" xmlns:r="http://schemas.openxmlformats.org/officeDocument/2006/relationships" xmlns:p="http://schemas.openxmlformats.org/presentationml/2006/main">
   <p:cSld>
     <p:spTree>

</xml_diff>